<commit_message>
With notes + still missing visuals
</commit_message>
<xml_diff>
--- a/ABM-slides.pptx
+++ b/ABM-slides.pptx
@@ -10,11 +10,11 @@
   <p:sldIdLst>
     <p:sldId id="261" r:id="rId2"/>
     <p:sldId id="262" r:id="rId3"/>
-    <p:sldId id="258" r:id="rId4"/>
-    <p:sldId id="265" r:id="rId5"/>
-    <p:sldId id="271" r:id="rId6"/>
-    <p:sldId id="320" r:id="rId7"/>
-    <p:sldId id="264" r:id="rId8"/>
+    <p:sldId id="322" r:id="rId4"/>
+    <p:sldId id="323" r:id="rId5"/>
+    <p:sldId id="258" r:id="rId6"/>
+    <p:sldId id="265" r:id="rId7"/>
+    <p:sldId id="271" r:id="rId8"/>
     <p:sldId id="260" r:id="rId9"/>
   </p:sldIdLst>
   <p:sldSz cx="12192000" cy="6858000"/>
@@ -114,6 +114,11 @@
       </a:defRPr>
     </a:lvl9pPr>
   </p:defaultTextStyle>
+  <p:extLst>
+    <p:ext uri="{EFAFB233-063F-42B5-8137-9DF3F51BA10A}">
+      <p15:sldGuideLst xmlns:p15="http://schemas.microsoft.com/office/powerpoint/2012/main"/>
+    </p:ext>
+  </p:extLst>
 </p:presentation>
 </file>
 
@@ -199,7 +204,7 @@
           <a:p>
             <a:fld id="{076E3288-2BFF-D24B-8033-DDD22F4694D5}" type="datetimeFigureOut">
               <a:rPr lang="de-DE" smtClean="0"/>
-              <a:t>27.04.21</a:t>
+              <a:t>01.05.21</a:t>
             </a:fld>
             <a:endParaRPr lang="de-DE"/>
           </a:p>
@@ -486,7 +491,7 @@
       </p:grpSpPr>
       <p:sp>
         <p:nvSpPr>
-          <p:cNvPr id="2" name="Pladsholder til slidebillede 1"/>
+          <p:cNvPr id="2" name="Slide Image Placeholder 1"/>
           <p:cNvSpPr>
             <a:spLocks noGrp="1" noRot="1" noChangeAspect="1"/>
           </p:cNvSpPr>
@@ -498,7 +503,7 @@
       </p:sp>
       <p:sp>
         <p:nvSpPr>
-          <p:cNvPr id="3" name="Pladsholder til noter 2"/>
+          <p:cNvPr id="3" name="Notes Placeholder 2"/>
           <p:cNvSpPr>
             <a:spLocks noGrp="1"/>
           </p:cNvSpPr>
@@ -511,18 +516,60 @@
           <a:bodyPr/>
           <a:lstStyle/>
           <a:p>
-            <a:endParaRPr lang="en-GB"/>
-          </a:p>
-        </p:txBody>
-      </p:sp>
-      <p:sp>
-        <p:nvSpPr>
-          <p:cNvPr id="4" name="Pladsholder til slidenummer 3"/>
-          <p:cNvSpPr>
-            <a:spLocks noGrp="1"/>
-          </p:cNvSpPr>
-          <p:nvPr>
-            <p:ph type="sldNum" sz="quarter" idx="10"/>
+            <a:r>
+              <a:rPr lang="en-DK" sz="1200" kern="1200" dirty="0">
+                <a:solidFill>
+                  <a:schemeClr val="tx1"/>
+                </a:solidFill>
+                <a:effectLst/>
+                <a:latin typeface="+mn-lt"/>
+                <a:ea typeface="+mn-ea"/>
+                <a:cs typeface="+mn-cs"/>
+              </a:rPr>
+              <a:t>Welcome to this video about EDU-IT.</a:t>
+            </a:r>
+          </a:p>
+          <a:p>
+            <a:r>
+              <a:rPr lang="en-DK" sz="1200" kern="1200" dirty="0">
+                <a:solidFill>
+                  <a:schemeClr val="tx1"/>
+                </a:solidFill>
+                <a:effectLst/>
+                <a:latin typeface="+mn-lt"/>
+                <a:ea typeface="+mn-ea"/>
+                <a:cs typeface="+mn-cs"/>
+              </a:rPr>
+              <a:t> </a:t>
+            </a:r>
+          </a:p>
+          <a:p>
+            <a:r>
+              <a:rPr lang="en-DK" sz="1200" kern="1200" dirty="0">
+                <a:solidFill>
+                  <a:schemeClr val="tx1"/>
+                </a:solidFill>
+                <a:effectLst/>
+                <a:latin typeface="+mn-lt"/>
+                <a:ea typeface="+mn-ea"/>
+                <a:cs typeface="+mn-cs"/>
+              </a:rPr>
+              <a:t>We are a team working under Science at Home for Aarhus University, and we develop learning materials for students at university-level.</a:t>
+            </a:r>
+          </a:p>
+          <a:p>
+            <a:endParaRPr lang="de-DE" dirty="0"/>
+          </a:p>
+        </p:txBody>
+      </p:sp>
+      <p:sp>
+        <p:nvSpPr>
+          <p:cNvPr id="4" name="Slide Number Placeholder 3"/>
+          <p:cNvSpPr>
+            <a:spLocks noGrp="1"/>
+          </p:cNvSpPr>
+          <p:nvPr>
+            <p:ph type="sldNum" sz="quarter" idx="5"/>
           </p:nvPr>
         </p:nvSpPr>
         <p:spPr/>
@@ -530,24 +577,18 @@
           <a:bodyPr/>
           <a:lstStyle/>
           <a:p>
-            <a:pPr>
-              <a:defRPr/>
-            </a:pPr>
-            <a:fld id="{72C160C3-3AB6-49C1-8001-AFDAD271EB5B}" type="slidenum">
-              <a:rPr lang="en-GB"/>
-              <a:pPr>
-                <a:defRPr/>
-              </a:pPr>
-              <a:t>3</a:t>
+            <a:fld id="{FC59E6FA-95B4-B24C-BBD9-3FF2D3C6402C}" type="slidenum">
+              <a:rPr lang="de-DE" smtClean="0"/>
+              <a:t>1</a:t>
             </a:fld>
-            <a:endParaRPr lang="en-GB" dirty="0"/>
+            <a:endParaRPr lang="de-DE"/>
           </a:p>
         </p:txBody>
       </p:sp>
     </p:spTree>
     <p:extLst>
       <p:ext uri="{BB962C8B-B14F-4D97-AF65-F5344CB8AC3E}">
-        <p14:creationId xmlns:p14="http://schemas.microsoft.com/office/powerpoint/2010/main" val="2432168804"/>
+        <p14:creationId xmlns:p14="http://schemas.microsoft.com/office/powerpoint/2010/main" val="3213926355"/>
       </p:ext>
     </p:extLst>
   </p:cSld>
@@ -576,7 +617,7 @@
       </p:grpSpPr>
       <p:sp>
         <p:nvSpPr>
-          <p:cNvPr id="2" name="Pladsholder til slidebillede 1"/>
+          <p:cNvPr id="2" name="Slide Image Placeholder 1"/>
           <p:cNvSpPr>
             <a:spLocks noGrp="1" noRot="1" noChangeAspect="1"/>
           </p:cNvSpPr>
@@ -588,7 +629,7 @@
       </p:sp>
       <p:sp>
         <p:nvSpPr>
-          <p:cNvPr id="3" name="Pladsholder til noter 2"/>
+          <p:cNvPr id="3" name="Notes Placeholder 2"/>
           <p:cNvSpPr>
             <a:spLocks noGrp="1"/>
           </p:cNvSpPr>
@@ -601,43 +642,68 @@
           <a:bodyPr/>
           <a:lstStyle/>
           <a:p>
-            <a:endParaRPr lang="en-GB"/>
-          </a:p>
-        </p:txBody>
-      </p:sp>
-      <p:sp>
-        <p:nvSpPr>
-          <p:cNvPr id="4" name="Pladsholder til slidenummer 3"/>
-          <p:cNvSpPr>
-            <a:spLocks noGrp="1"/>
-          </p:cNvSpPr>
-          <p:nvPr>
-            <p:ph type="sldNum" sz="quarter" idx="10"/>
-          </p:nvPr>
-        </p:nvSpPr>
-        <p:spPr/>
-        <p:txBody>
-          <a:bodyPr/>
-          <a:lstStyle/>
-          <a:p>
-            <a:pPr>
+            <a:pPr marL="0" marR="0" lvl="0" indent="0" algn="l" defTabSz="914400" rtl="0" eaLnBrk="1" fontAlgn="auto" latinLnBrk="0" hangingPunct="1">
+              <a:lnSpc>
+                <a:spcPct val="100000"/>
+              </a:lnSpc>
+              <a:spcBef>
+                <a:spcPts val="0"/>
+              </a:spcBef>
+              <a:spcAft>
+                <a:spcPts val="0"/>
+              </a:spcAft>
+              <a:buClrTx/>
+              <a:buSzTx/>
+              <a:buFontTx/>
+              <a:buNone/>
+              <a:tabLst/>
               <a:defRPr/>
             </a:pPr>
-            <a:fld id="{72C160C3-3AB6-49C1-8001-AFDAD271EB5B}" type="slidenum">
-              <a:rPr lang="en-GB"/>
-              <a:pPr>
-                <a:defRPr/>
-              </a:pPr>
-              <a:t>4</a:t>
+            <a:r>
+              <a:rPr lang="en-DK" sz="1200" kern="1200" dirty="0">
+                <a:solidFill>
+                  <a:schemeClr val="tx1"/>
+                </a:solidFill>
+                <a:effectLst/>
+                <a:latin typeface="+mn-lt"/>
+                <a:ea typeface="+mn-ea"/>
+                <a:cs typeface="+mn-cs"/>
+              </a:rPr>
+              <a:t>We create ABMs, which we like to think of as virtual laboratories. We use available data to build simulation-like models, which enables students to investigate and test out hypotheses in fields in which carrying out similar investigations in the real world is not possible for some reason, whether it be economical, ethical reasons or practical reasons.</a:t>
+            </a:r>
+          </a:p>
+          <a:p>
+            <a:endParaRPr lang="de-DE" dirty="0"/>
+          </a:p>
+        </p:txBody>
+      </p:sp>
+      <p:sp>
+        <p:nvSpPr>
+          <p:cNvPr id="4" name="Slide Number Placeholder 3"/>
+          <p:cNvSpPr>
+            <a:spLocks noGrp="1"/>
+          </p:cNvSpPr>
+          <p:nvPr>
+            <p:ph type="sldNum" sz="quarter" idx="5"/>
+          </p:nvPr>
+        </p:nvSpPr>
+        <p:spPr/>
+        <p:txBody>
+          <a:bodyPr/>
+          <a:lstStyle/>
+          <a:p>
+            <a:fld id="{FC59E6FA-95B4-B24C-BBD9-3FF2D3C6402C}" type="slidenum">
+              <a:rPr lang="de-DE" smtClean="0"/>
+              <a:t>2</a:t>
             </a:fld>
-            <a:endParaRPr lang="en-GB" dirty="0"/>
+            <a:endParaRPr lang="de-DE"/>
           </a:p>
         </p:txBody>
       </p:sp>
     </p:spTree>
     <p:extLst>
       <p:ext uri="{BB962C8B-B14F-4D97-AF65-F5344CB8AC3E}">
-        <p14:creationId xmlns:p14="http://schemas.microsoft.com/office/powerpoint/2010/main" val="2882896611"/>
+        <p14:creationId xmlns:p14="http://schemas.microsoft.com/office/powerpoint/2010/main" val="66749433"/>
       </p:ext>
     </p:extLst>
   </p:cSld>
@@ -666,6 +732,788 @@
       </p:grpSpPr>
       <p:sp>
         <p:nvSpPr>
+          <p:cNvPr id="2" name="Pladsholder til slidebillede 1"/>
+          <p:cNvSpPr>
+            <a:spLocks noGrp="1" noRot="1" noChangeAspect="1"/>
+          </p:cNvSpPr>
+          <p:nvPr>
+            <p:ph type="sldImg"/>
+          </p:nvPr>
+        </p:nvSpPr>
+        <p:spPr/>
+      </p:sp>
+      <p:sp>
+        <p:nvSpPr>
+          <p:cNvPr id="3" name="Pladsholder til noter 2"/>
+          <p:cNvSpPr>
+            <a:spLocks noGrp="1"/>
+          </p:cNvSpPr>
+          <p:nvPr>
+            <p:ph type="body" idx="1"/>
+          </p:nvPr>
+        </p:nvSpPr>
+        <p:spPr/>
+        <p:txBody>
+          <a:bodyPr/>
+          <a:lstStyle/>
+          <a:p>
+            <a:pPr rtl="0"/>
+            <a:r>
+              <a:rPr lang="en-GB" sz="1200" b="0" i="0" u="none" strike="noStrike" kern="1200" dirty="0">
+                <a:solidFill>
+                  <a:schemeClr val="tx1"/>
+                </a:solidFill>
+                <a:effectLst/>
+                <a:latin typeface="+mn-lt"/>
+                <a:ea typeface="+mn-ea"/>
+                <a:cs typeface="+mn-cs"/>
+              </a:rPr>
+              <a:t>The departments that we have collaborated with so far include linguistics and theory of science.</a:t>
+            </a:r>
+            <a:endParaRPr lang="en-GB" b="0" dirty="0">
+              <a:effectLst/>
+            </a:endParaRPr>
+          </a:p>
+          <a:p>
+            <a:pPr rtl="0"/>
+            <a:endParaRPr lang="en-GB" sz="1200" b="0" i="0" u="none" strike="noStrike" kern="1200" dirty="0">
+              <a:solidFill>
+                <a:schemeClr val="tx1"/>
+              </a:solidFill>
+              <a:effectLst/>
+              <a:latin typeface="+mn-lt"/>
+              <a:ea typeface="+mn-ea"/>
+              <a:cs typeface="+mn-cs"/>
+            </a:endParaRPr>
+          </a:p>
+          <a:p>
+            <a:pPr rtl="0"/>
+            <a:r>
+              <a:rPr lang="en-GB" sz="1200" b="0" i="0" u="none" strike="noStrike" kern="1200" dirty="0">
+                <a:solidFill>
+                  <a:schemeClr val="tx1"/>
+                </a:solidFill>
+                <a:effectLst/>
+                <a:latin typeface="+mn-lt"/>
+                <a:ea typeface="+mn-ea"/>
+                <a:cs typeface="+mn-cs"/>
+              </a:rPr>
+              <a:t>With theory of science, we made a model to try to understand the spread of virus in a society during an epidemic.</a:t>
+            </a:r>
+          </a:p>
+          <a:p>
+            <a:pPr rtl="0"/>
+            <a:br>
+              <a:rPr lang="en-GB" b="0" dirty="0">
+                <a:effectLst/>
+              </a:rPr>
+            </a:br>
+            <a:r>
+              <a:rPr lang="en-GB" sz="1200" b="0" i="0" u="none" strike="noStrike" kern="1200" dirty="0">
+                <a:solidFill>
+                  <a:schemeClr val="tx1"/>
+                </a:solidFill>
+                <a:effectLst/>
+                <a:latin typeface="+mn-lt"/>
+                <a:ea typeface="+mn-ea"/>
+                <a:cs typeface="+mn-cs"/>
+              </a:rPr>
+              <a:t>With the linguistics department, we looked into how a creole (new language) might emerge, when different language-speaking people meet and need to communicate.</a:t>
+            </a:r>
+          </a:p>
+          <a:p>
+            <a:pPr rtl="0"/>
+            <a:endParaRPr lang="en-GB" sz="1200" b="0" i="0" u="none" strike="noStrike" kern="1200" dirty="0">
+              <a:solidFill>
+                <a:schemeClr val="tx1"/>
+              </a:solidFill>
+              <a:effectLst/>
+              <a:latin typeface="+mn-lt"/>
+              <a:ea typeface="+mn-ea"/>
+              <a:cs typeface="+mn-cs"/>
+            </a:endParaRPr>
+          </a:p>
+          <a:p>
+            <a:pPr marL="0" marR="0" lvl="0" indent="0" algn="l" defTabSz="914400" rtl="0" eaLnBrk="1" fontAlgn="auto" latinLnBrk="0" hangingPunct="1">
+              <a:lnSpc>
+                <a:spcPct val="100000"/>
+              </a:lnSpc>
+              <a:spcBef>
+                <a:spcPts val="0"/>
+              </a:spcBef>
+              <a:spcAft>
+                <a:spcPts val="0"/>
+              </a:spcAft>
+              <a:buClrTx/>
+              <a:buSzTx/>
+              <a:buFontTx/>
+              <a:buNone/>
+              <a:tabLst/>
+              <a:defRPr/>
+            </a:pPr>
+            <a:r>
+              <a:rPr lang="en-DK" sz="1200" kern="1200" dirty="0">
+                <a:solidFill>
+                  <a:schemeClr val="tx1"/>
+                </a:solidFill>
+                <a:effectLst/>
+                <a:latin typeface="+mn-lt"/>
+                <a:ea typeface="+mn-ea"/>
+                <a:cs typeface="+mn-cs"/>
+              </a:rPr>
+              <a:t>If you are interested in learning more about these models, they are available here on the website.</a:t>
+            </a:r>
+          </a:p>
+          <a:p>
+            <a:pPr rtl="0"/>
+            <a:r>
+              <a:rPr lang="en-GB" sz="1200" b="0" i="0" u="none" strike="noStrike" kern="1200" dirty="0">
+                <a:solidFill>
+                  <a:schemeClr val="tx1"/>
+                </a:solidFill>
+                <a:effectLst/>
+                <a:latin typeface="+mn-lt"/>
+                <a:ea typeface="+mn-ea"/>
+                <a:cs typeface="+mn-cs"/>
+              </a:rPr>
+              <a:t>And now, allow me to elaborate on what exactly agent-based models are.</a:t>
+            </a:r>
+            <a:endParaRPr lang="en-GB" b="0" dirty="0">
+              <a:effectLst/>
+            </a:endParaRPr>
+          </a:p>
+        </p:txBody>
+      </p:sp>
+      <p:sp>
+        <p:nvSpPr>
+          <p:cNvPr id="4" name="Pladsholder til slidenummer 3"/>
+          <p:cNvSpPr>
+            <a:spLocks noGrp="1"/>
+          </p:cNvSpPr>
+          <p:nvPr>
+            <p:ph type="sldNum" sz="quarter" idx="10"/>
+          </p:nvPr>
+        </p:nvSpPr>
+        <p:spPr/>
+        <p:txBody>
+          <a:bodyPr/>
+          <a:lstStyle/>
+          <a:p>
+            <a:pPr>
+              <a:defRPr/>
+            </a:pPr>
+            <a:fld id="{72C160C3-3AB6-49C1-8001-AFDAD271EB5B}" type="slidenum">
+              <a:rPr lang="en-GB"/>
+              <a:pPr>
+                <a:defRPr/>
+              </a:pPr>
+              <a:t>3</a:t>
+            </a:fld>
+            <a:endParaRPr lang="en-GB" dirty="0"/>
+          </a:p>
+        </p:txBody>
+      </p:sp>
+    </p:spTree>
+    <p:extLst>
+      <p:ext uri="{BB962C8B-B14F-4D97-AF65-F5344CB8AC3E}">
+        <p14:creationId xmlns:p14="http://schemas.microsoft.com/office/powerpoint/2010/main" val="3888712139"/>
+      </p:ext>
+    </p:extLst>
+  </p:cSld>
+  <p:clrMapOvr>
+    <a:masterClrMapping/>
+  </p:clrMapOvr>
+</p:notes>
+</file>
+
+<file path=ppt/notesSlides/notesSlide4.xml><?xml version="1.0" encoding="utf-8"?>
+<p:notes xmlns:a="http://schemas.openxmlformats.org/drawingml/2006/main" xmlns:r="http://schemas.openxmlformats.org/officeDocument/2006/relationships" xmlns:p="http://schemas.openxmlformats.org/presentationml/2006/main">
+  <p:cSld>
+    <p:spTree>
+      <p:nvGrpSpPr>
+        <p:cNvPr id="1" name=""/>
+        <p:cNvGrpSpPr/>
+        <p:nvPr/>
+      </p:nvGrpSpPr>
+      <p:grpSpPr>
+        <a:xfrm>
+          <a:off x="0" y="0"/>
+          <a:ext cx="0" cy="0"/>
+          <a:chOff x="0" y="0"/>
+          <a:chExt cx="0" cy="0"/>
+        </a:xfrm>
+      </p:grpSpPr>
+      <p:sp>
+        <p:nvSpPr>
+          <p:cNvPr id="2" name="Pladsholder til slidebillede 1"/>
+          <p:cNvSpPr>
+            <a:spLocks noGrp="1" noRot="1" noChangeAspect="1"/>
+          </p:cNvSpPr>
+          <p:nvPr>
+            <p:ph type="sldImg"/>
+          </p:nvPr>
+        </p:nvSpPr>
+        <p:spPr/>
+      </p:sp>
+      <p:sp>
+        <p:nvSpPr>
+          <p:cNvPr id="3" name="Pladsholder til noter 2"/>
+          <p:cNvSpPr>
+            <a:spLocks noGrp="1"/>
+          </p:cNvSpPr>
+          <p:nvPr>
+            <p:ph type="body" idx="1"/>
+          </p:nvPr>
+        </p:nvSpPr>
+        <p:spPr/>
+        <p:txBody>
+          <a:bodyPr/>
+          <a:lstStyle/>
+          <a:p>
+            <a:r>
+              <a:rPr lang="en-DK" sz="1200" kern="1200" dirty="0">
+                <a:solidFill>
+                  <a:schemeClr val="tx1"/>
+                </a:solidFill>
+                <a:effectLst/>
+                <a:latin typeface="+mn-lt"/>
+                <a:ea typeface="+mn-ea"/>
+                <a:cs typeface="+mn-cs"/>
+              </a:rPr>
+              <a:t>ABM</a:t>
+            </a:r>
+            <a:r>
+              <a:rPr lang="en-US" sz="1200" kern="1200" dirty="0">
+                <a:solidFill>
+                  <a:schemeClr val="tx1"/>
+                </a:solidFill>
+                <a:effectLst/>
+                <a:latin typeface="+mn-lt"/>
+                <a:ea typeface="+mn-ea"/>
+                <a:cs typeface="+mn-cs"/>
+              </a:rPr>
+              <a:t>s</a:t>
+            </a:r>
+            <a:r>
+              <a:rPr lang="en-DK" sz="1200" kern="1200" dirty="0">
+                <a:solidFill>
+                  <a:schemeClr val="tx1"/>
+                </a:solidFill>
+                <a:effectLst/>
+                <a:latin typeface="+mn-lt"/>
+                <a:ea typeface="+mn-ea"/>
+                <a:cs typeface="+mn-cs"/>
+              </a:rPr>
+              <a:t> are computational representations of complex systems; that is phenomena, that consists of several autonomously interacting parts, which makes them difficult to make predictions about! Because they are non-linear and prone to feedback loops etc.</a:t>
+            </a:r>
+          </a:p>
+          <a:p>
+            <a:r>
+              <a:rPr lang="en-DK" sz="1200" kern="1200" dirty="0">
+                <a:solidFill>
+                  <a:schemeClr val="tx1"/>
+                </a:solidFill>
+                <a:effectLst/>
+                <a:latin typeface="+mn-lt"/>
+                <a:ea typeface="+mn-ea"/>
+                <a:cs typeface="+mn-cs"/>
+              </a:rPr>
+              <a:t> </a:t>
+            </a:r>
+          </a:p>
+          <a:p>
+            <a:r>
+              <a:rPr lang="en-DK" sz="1200" kern="1200" dirty="0">
+                <a:solidFill>
+                  <a:schemeClr val="tx1"/>
+                </a:solidFill>
+                <a:effectLst/>
+                <a:latin typeface="+mn-lt"/>
+                <a:ea typeface="+mn-ea"/>
+                <a:cs typeface="+mn-cs"/>
+              </a:rPr>
+              <a:t>Let’s make it clearer with an example: Here is an ecosystem consisting of </a:t>
+            </a:r>
+            <a:r>
+              <a:rPr lang="da-DK" sz="1200" kern="1200" dirty="0" err="1">
+                <a:solidFill>
+                  <a:schemeClr val="tx1"/>
+                </a:solidFill>
+                <a:effectLst/>
+                <a:latin typeface="+mn-lt"/>
+                <a:ea typeface="+mn-ea"/>
+                <a:cs typeface="+mn-cs"/>
+              </a:rPr>
+              <a:t>three</a:t>
+            </a:r>
+            <a:r>
+              <a:rPr lang="da-DK" sz="1200" kern="1200" dirty="0">
+                <a:solidFill>
+                  <a:schemeClr val="tx1"/>
+                </a:solidFill>
+                <a:effectLst/>
+                <a:latin typeface="+mn-lt"/>
+                <a:ea typeface="+mn-ea"/>
+                <a:cs typeface="+mn-cs"/>
+              </a:rPr>
+              <a:t> elements: W</a:t>
+            </a:r>
+            <a:r>
+              <a:rPr lang="en-DK" sz="1200" kern="1200" dirty="0">
+                <a:solidFill>
+                  <a:schemeClr val="tx1"/>
+                </a:solidFill>
+                <a:effectLst/>
+                <a:latin typeface="+mn-lt"/>
+                <a:ea typeface="+mn-ea"/>
+                <a:cs typeface="+mn-cs"/>
+              </a:rPr>
+              <a:t>olves, sheep, and grass.</a:t>
+            </a:r>
+          </a:p>
+        </p:txBody>
+      </p:sp>
+      <p:sp>
+        <p:nvSpPr>
+          <p:cNvPr id="4" name="Pladsholder til slidenummer 3"/>
+          <p:cNvSpPr>
+            <a:spLocks noGrp="1"/>
+          </p:cNvSpPr>
+          <p:nvPr>
+            <p:ph type="sldNum" sz="quarter" idx="10"/>
+          </p:nvPr>
+        </p:nvSpPr>
+        <p:spPr/>
+        <p:txBody>
+          <a:bodyPr/>
+          <a:lstStyle/>
+          <a:p>
+            <a:pPr>
+              <a:defRPr/>
+            </a:pPr>
+            <a:fld id="{72C160C3-3AB6-49C1-8001-AFDAD271EB5B}" type="slidenum">
+              <a:rPr lang="en-GB"/>
+              <a:pPr>
+                <a:defRPr/>
+              </a:pPr>
+              <a:t>4</a:t>
+            </a:fld>
+            <a:endParaRPr lang="en-GB" dirty="0"/>
+          </a:p>
+        </p:txBody>
+      </p:sp>
+    </p:spTree>
+    <p:extLst>
+      <p:ext uri="{BB962C8B-B14F-4D97-AF65-F5344CB8AC3E}">
+        <p14:creationId xmlns:p14="http://schemas.microsoft.com/office/powerpoint/2010/main" val="405544860"/>
+      </p:ext>
+    </p:extLst>
+  </p:cSld>
+  <p:clrMapOvr>
+    <a:masterClrMapping/>
+  </p:clrMapOvr>
+</p:notes>
+</file>
+
+<file path=ppt/notesSlides/notesSlide5.xml><?xml version="1.0" encoding="utf-8"?>
+<p:notes xmlns:a="http://schemas.openxmlformats.org/drawingml/2006/main" xmlns:r="http://schemas.openxmlformats.org/officeDocument/2006/relationships" xmlns:p="http://schemas.openxmlformats.org/presentationml/2006/main">
+  <p:cSld>
+    <p:spTree>
+      <p:nvGrpSpPr>
+        <p:cNvPr id="1" name=""/>
+        <p:cNvGrpSpPr/>
+        <p:nvPr/>
+      </p:nvGrpSpPr>
+      <p:grpSpPr>
+        <a:xfrm>
+          <a:off x="0" y="0"/>
+          <a:ext cx="0" cy="0"/>
+          <a:chOff x="0" y="0"/>
+          <a:chExt cx="0" cy="0"/>
+        </a:xfrm>
+      </p:grpSpPr>
+      <p:sp>
+        <p:nvSpPr>
+          <p:cNvPr id="2" name="Pladsholder til slidebillede 1"/>
+          <p:cNvSpPr>
+            <a:spLocks noGrp="1" noRot="1" noChangeAspect="1"/>
+          </p:cNvSpPr>
+          <p:nvPr>
+            <p:ph type="sldImg"/>
+          </p:nvPr>
+        </p:nvSpPr>
+        <p:spPr/>
+      </p:sp>
+      <p:sp>
+        <p:nvSpPr>
+          <p:cNvPr id="3" name="Pladsholder til noter 2"/>
+          <p:cNvSpPr>
+            <a:spLocks noGrp="1"/>
+          </p:cNvSpPr>
+          <p:nvPr>
+            <p:ph type="body" idx="1"/>
+          </p:nvPr>
+        </p:nvSpPr>
+        <p:spPr/>
+        <p:txBody>
+          <a:bodyPr/>
+          <a:lstStyle/>
+          <a:p>
+            <a:r>
+              <a:rPr lang="en-DK" sz="1200" kern="1200" dirty="0">
+                <a:solidFill>
+                  <a:schemeClr val="tx1"/>
+                </a:solidFill>
+                <a:effectLst/>
+                <a:latin typeface="+mn-lt"/>
+                <a:ea typeface="+mn-ea"/>
+                <a:cs typeface="+mn-cs"/>
+              </a:rPr>
+              <a:t>We know that each of these three groups have different behaviors from one another. We can generalize their behavior to build an ABM. We need to describe how the group functions and interacts with the others.</a:t>
+            </a:r>
+          </a:p>
+          <a:p>
+            <a:r>
+              <a:rPr lang="en-US" sz="1200" b="1" kern="1200" dirty="0">
+                <a:solidFill>
+                  <a:schemeClr val="tx1"/>
+                </a:solidFill>
+                <a:effectLst/>
+                <a:latin typeface="+mn-lt"/>
+                <a:ea typeface="+mn-ea"/>
+                <a:cs typeface="+mn-cs"/>
+              </a:rPr>
+              <a:t> </a:t>
+            </a:r>
+            <a:endParaRPr lang="en-DK" sz="1200" kern="1200" dirty="0">
+              <a:solidFill>
+                <a:schemeClr val="tx1"/>
+              </a:solidFill>
+              <a:effectLst/>
+              <a:latin typeface="+mn-lt"/>
+              <a:ea typeface="+mn-ea"/>
+              <a:cs typeface="+mn-cs"/>
+            </a:endParaRPr>
+          </a:p>
+          <a:p>
+            <a:r>
+              <a:rPr lang="en-DK" sz="1200" kern="1200" dirty="0">
+                <a:solidFill>
+                  <a:schemeClr val="tx1"/>
+                </a:solidFill>
+                <a:effectLst/>
+                <a:latin typeface="+mn-lt"/>
+                <a:ea typeface="+mn-ea"/>
+                <a:cs typeface="+mn-cs"/>
+              </a:rPr>
+              <a:t>In this case, we can say that </a:t>
+            </a:r>
+            <a:r>
+              <a:rPr lang="en-DK" sz="1200" b="1" kern="1200" dirty="0">
+                <a:solidFill>
+                  <a:schemeClr val="tx1"/>
+                </a:solidFill>
+                <a:effectLst/>
+                <a:latin typeface="+mn-lt"/>
+                <a:ea typeface="+mn-ea"/>
+                <a:cs typeface="+mn-cs"/>
+              </a:rPr>
+              <a:t>wolves</a:t>
+            </a:r>
+            <a:r>
+              <a:rPr lang="en-DK" sz="1200" kern="1200" dirty="0">
+                <a:solidFill>
+                  <a:schemeClr val="tx1"/>
+                </a:solidFill>
+                <a:effectLst/>
+                <a:latin typeface="+mn-lt"/>
+                <a:ea typeface="+mn-ea"/>
+                <a:cs typeface="+mn-cs"/>
+              </a:rPr>
+              <a:t> need energy to live</a:t>
+            </a:r>
+            <a:r>
+              <a:rPr lang="en-DK" sz="1200" i="1" kern="1200" dirty="0">
+                <a:solidFill>
+                  <a:schemeClr val="tx1"/>
+                </a:solidFill>
+                <a:effectLst/>
+                <a:latin typeface="+mn-lt"/>
+                <a:ea typeface="+mn-ea"/>
+                <a:cs typeface="+mn-cs"/>
+              </a:rPr>
+              <a:t>, </a:t>
+            </a:r>
+            <a:r>
+              <a:rPr lang="en-DK" sz="1200" kern="1200" dirty="0">
+                <a:solidFill>
+                  <a:schemeClr val="tx1"/>
+                </a:solidFill>
+                <a:effectLst/>
+                <a:latin typeface="+mn-lt"/>
+                <a:ea typeface="+mn-ea"/>
+                <a:cs typeface="+mn-cs"/>
+              </a:rPr>
+              <a:t>and they get that from eating sheep. If they don’t get that energy, they die. If they get a surplus of energy, there is a chance that they will reproduce.</a:t>
+            </a:r>
+          </a:p>
+          <a:p>
+            <a:r>
+              <a:rPr lang="en-DK" sz="1200" kern="1200" dirty="0">
+                <a:solidFill>
+                  <a:schemeClr val="tx1"/>
+                </a:solidFill>
+                <a:effectLst/>
+                <a:latin typeface="+mn-lt"/>
+                <a:ea typeface="+mn-ea"/>
+                <a:cs typeface="+mn-cs"/>
+              </a:rPr>
+              <a:t> </a:t>
+            </a:r>
+          </a:p>
+          <a:p>
+            <a:r>
+              <a:rPr lang="en-DK" sz="1200" kern="1200" dirty="0">
+                <a:solidFill>
+                  <a:schemeClr val="tx1"/>
+                </a:solidFill>
+                <a:effectLst/>
+                <a:latin typeface="+mn-lt"/>
+                <a:ea typeface="+mn-ea"/>
+                <a:cs typeface="+mn-cs"/>
+              </a:rPr>
+              <a:t>Similarly for the sheep, they also need energy to live, which they get from eating grass. If they don’t get enough, they die. If they get plenty energy, they reproduce. Oh, and then they might get eaten by a hungry wolf.</a:t>
+            </a:r>
+          </a:p>
+          <a:p>
+            <a:r>
+              <a:rPr lang="en-DK" sz="1200" kern="1200" dirty="0">
+                <a:solidFill>
+                  <a:schemeClr val="tx1"/>
+                </a:solidFill>
+                <a:effectLst/>
+                <a:latin typeface="+mn-lt"/>
+                <a:ea typeface="+mn-ea"/>
+                <a:cs typeface="+mn-cs"/>
+              </a:rPr>
+              <a:t> </a:t>
+            </a:r>
+          </a:p>
+          <a:p>
+            <a:r>
+              <a:rPr lang="en-DK" sz="1200" kern="1200" dirty="0">
+                <a:solidFill>
+                  <a:schemeClr val="tx1"/>
+                </a:solidFill>
+                <a:effectLst/>
+                <a:latin typeface="+mn-lt"/>
+                <a:ea typeface="+mn-ea"/>
+                <a:cs typeface="+mn-cs"/>
+              </a:rPr>
+              <a:t>Finally, we have a third agent – the grass, which has a very simply behavior. It can be eaten by sheep; in which case it will take a certain amount of time for it to regrow.</a:t>
+            </a:r>
+          </a:p>
+        </p:txBody>
+      </p:sp>
+      <p:sp>
+        <p:nvSpPr>
+          <p:cNvPr id="4" name="Pladsholder til slidenummer 3"/>
+          <p:cNvSpPr>
+            <a:spLocks noGrp="1"/>
+          </p:cNvSpPr>
+          <p:nvPr>
+            <p:ph type="sldNum" sz="quarter" idx="10"/>
+          </p:nvPr>
+        </p:nvSpPr>
+        <p:spPr/>
+        <p:txBody>
+          <a:bodyPr/>
+          <a:lstStyle/>
+          <a:p>
+            <a:pPr>
+              <a:defRPr/>
+            </a:pPr>
+            <a:fld id="{72C160C3-3AB6-49C1-8001-AFDAD271EB5B}" type="slidenum">
+              <a:rPr lang="en-GB"/>
+              <a:pPr>
+                <a:defRPr/>
+              </a:pPr>
+              <a:t>5</a:t>
+            </a:fld>
+            <a:endParaRPr lang="en-GB" dirty="0"/>
+          </a:p>
+        </p:txBody>
+      </p:sp>
+    </p:spTree>
+    <p:extLst>
+      <p:ext uri="{BB962C8B-B14F-4D97-AF65-F5344CB8AC3E}">
+        <p14:creationId xmlns:p14="http://schemas.microsoft.com/office/powerpoint/2010/main" val="2432168804"/>
+      </p:ext>
+    </p:extLst>
+  </p:cSld>
+  <p:clrMapOvr>
+    <a:masterClrMapping/>
+  </p:clrMapOvr>
+</p:notes>
+</file>
+
+<file path=ppt/notesSlides/notesSlide6.xml><?xml version="1.0" encoding="utf-8"?>
+<p:notes xmlns:a="http://schemas.openxmlformats.org/drawingml/2006/main" xmlns:r="http://schemas.openxmlformats.org/officeDocument/2006/relationships" xmlns:p="http://schemas.openxmlformats.org/presentationml/2006/main">
+  <p:cSld>
+    <p:spTree>
+      <p:nvGrpSpPr>
+        <p:cNvPr id="1" name=""/>
+        <p:cNvGrpSpPr/>
+        <p:nvPr/>
+      </p:nvGrpSpPr>
+      <p:grpSpPr>
+        <a:xfrm>
+          <a:off x="0" y="0"/>
+          <a:ext cx="0" cy="0"/>
+          <a:chOff x="0" y="0"/>
+          <a:chExt cx="0" cy="0"/>
+        </a:xfrm>
+      </p:grpSpPr>
+      <p:sp>
+        <p:nvSpPr>
+          <p:cNvPr id="2" name="Pladsholder til slidebillede 1"/>
+          <p:cNvSpPr>
+            <a:spLocks noGrp="1" noRot="1" noChangeAspect="1"/>
+          </p:cNvSpPr>
+          <p:nvPr>
+            <p:ph type="sldImg"/>
+          </p:nvPr>
+        </p:nvSpPr>
+        <p:spPr/>
+      </p:sp>
+      <p:sp>
+        <p:nvSpPr>
+          <p:cNvPr id="3" name="Pladsholder til noter 2"/>
+          <p:cNvSpPr>
+            <a:spLocks noGrp="1"/>
+          </p:cNvSpPr>
+          <p:nvPr>
+            <p:ph type="body" idx="1"/>
+          </p:nvPr>
+        </p:nvSpPr>
+        <p:spPr/>
+        <p:txBody>
+          <a:bodyPr/>
+          <a:lstStyle/>
+          <a:p>
+            <a:r>
+              <a:rPr lang="en-DK" sz="1200" kern="1200" dirty="0">
+                <a:solidFill>
+                  <a:schemeClr val="tx1"/>
+                </a:solidFill>
+                <a:effectLst/>
+                <a:latin typeface="+mn-lt"/>
+                <a:ea typeface="+mn-ea"/>
+                <a:cs typeface="+mn-cs"/>
+              </a:rPr>
+              <a:t>So, now we have described the agents of the systems and the behavior between them. And just like that, we have described a complex system in such simple terms that even a kindergartener could understand it.</a:t>
+            </a:r>
+          </a:p>
+          <a:p>
+            <a:r>
+              <a:rPr lang="en-US" sz="1200" b="1" kern="1200" dirty="0">
+                <a:solidFill>
+                  <a:schemeClr val="tx1"/>
+                </a:solidFill>
+                <a:effectLst/>
+                <a:latin typeface="+mn-lt"/>
+                <a:ea typeface="+mn-ea"/>
+                <a:cs typeface="+mn-cs"/>
+              </a:rPr>
+              <a:t> </a:t>
+            </a:r>
+            <a:endParaRPr lang="en-DK" sz="1200" kern="1200" dirty="0">
+              <a:solidFill>
+                <a:schemeClr val="tx1"/>
+              </a:solidFill>
+              <a:effectLst/>
+              <a:latin typeface="+mn-lt"/>
+              <a:ea typeface="+mn-ea"/>
+              <a:cs typeface="+mn-cs"/>
+            </a:endParaRPr>
+          </a:p>
+          <a:p>
+            <a:r>
+              <a:rPr lang="en-DK" sz="1200" kern="1200" dirty="0">
+                <a:solidFill>
+                  <a:schemeClr val="tx1"/>
+                </a:solidFill>
+                <a:effectLst/>
+                <a:latin typeface="+mn-lt"/>
+                <a:ea typeface="+mn-ea"/>
+                <a:cs typeface="+mn-cs"/>
+              </a:rPr>
+              <a:t>*run the model*</a:t>
+            </a:r>
+          </a:p>
+        </p:txBody>
+      </p:sp>
+      <p:sp>
+        <p:nvSpPr>
+          <p:cNvPr id="4" name="Pladsholder til slidenummer 3"/>
+          <p:cNvSpPr>
+            <a:spLocks noGrp="1"/>
+          </p:cNvSpPr>
+          <p:nvPr>
+            <p:ph type="sldNum" sz="quarter" idx="10"/>
+          </p:nvPr>
+        </p:nvSpPr>
+        <p:spPr/>
+        <p:txBody>
+          <a:bodyPr/>
+          <a:lstStyle/>
+          <a:p>
+            <a:pPr>
+              <a:defRPr/>
+            </a:pPr>
+            <a:fld id="{72C160C3-3AB6-49C1-8001-AFDAD271EB5B}" type="slidenum">
+              <a:rPr lang="en-GB"/>
+              <a:pPr>
+                <a:defRPr/>
+              </a:pPr>
+              <a:t>6</a:t>
+            </a:fld>
+            <a:endParaRPr lang="en-GB" dirty="0"/>
+          </a:p>
+        </p:txBody>
+      </p:sp>
+    </p:spTree>
+    <p:extLst>
+      <p:ext uri="{BB962C8B-B14F-4D97-AF65-F5344CB8AC3E}">
+        <p14:creationId xmlns:p14="http://schemas.microsoft.com/office/powerpoint/2010/main" val="2882896611"/>
+      </p:ext>
+    </p:extLst>
+  </p:cSld>
+  <p:clrMapOvr>
+    <a:masterClrMapping/>
+  </p:clrMapOvr>
+</p:notes>
+</file>
+
+<file path=ppt/notesSlides/notesSlide7.xml><?xml version="1.0" encoding="utf-8"?>
+<p:notes xmlns:a="http://schemas.openxmlformats.org/drawingml/2006/main" xmlns:r="http://schemas.openxmlformats.org/officeDocument/2006/relationships" xmlns:p="http://schemas.openxmlformats.org/presentationml/2006/main">
+  <p:cSld>
+    <p:spTree>
+      <p:nvGrpSpPr>
+        <p:cNvPr id="1" name=""/>
+        <p:cNvGrpSpPr/>
+        <p:nvPr/>
+      </p:nvGrpSpPr>
+      <p:grpSpPr>
+        <a:xfrm>
+          <a:off x="0" y="0"/>
+          <a:ext cx="0" cy="0"/>
+          <a:chOff x="0" y="0"/>
+          <a:chExt cx="0" cy="0"/>
+        </a:xfrm>
+      </p:grpSpPr>
+      <p:sp>
+        <p:nvSpPr>
           <p:cNvPr id="2" name="Slide Image Placeholder 1"/>
           <p:cNvSpPr>
             <a:spLocks noGrp="1" noRot="1" noChangeAspect="1"/>
@@ -692,16 +1540,113 @@
           <a:lstStyle/>
           <a:p>
             <a:r>
-              <a:rPr lang="da-DK" sz="3200" b="1" dirty="0"/>
-              <a:t>So now that we have these computational representations that let more people work with complex systems,  how do we get them into classrooms or other educatonal contexts? And what does that look like?</a:t>
-            </a:r>
-          </a:p>
-          <a:p>
-            <a:r>
-              <a:rPr lang="da-DK" sz="3200" b="1" dirty="0"/>
-              <a:t>First want to talk briefly about how I typically work</a:t>
-            </a:r>
-            <a:endParaRPr lang="en-US" sz="3200" b="1" dirty="0"/>
+              <a:rPr lang="en-DK" sz="1200" kern="1200" dirty="0">
+                <a:solidFill>
+                  <a:schemeClr val="tx1"/>
+                </a:solidFill>
+                <a:effectLst/>
+                <a:latin typeface="+mn-lt"/>
+                <a:ea typeface="+mn-ea"/>
+                <a:cs typeface="+mn-cs"/>
+              </a:rPr>
+              <a:t>If we compare the ABM that we have just made to its mathematical equivalent, it is clear that understanding the mathematical model is much more difficult. And this is a great strength of ABM – the underlying logic is </a:t>
+            </a:r>
+            <a:r>
+              <a:rPr lang="en-DK" sz="1200" i="1" kern="1200" dirty="0">
+                <a:solidFill>
+                  <a:schemeClr val="tx1"/>
+                </a:solidFill>
+                <a:effectLst/>
+                <a:latin typeface="+mn-lt"/>
+                <a:ea typeface="+mn-ea"/>
+                <a:cs typeface="+mn-cs"/>
+              </a:rPr>
+              <a:t>very clear.</a:t>
+            </a:r>
+            <a:endParaRPr lang="en-DK" sz="1200" kern="1200" dirty="0">
+              <a:solidFill>
+                <a:schemeClr val="tx1"/>
+              </a:solidFill>
+              <a:effectLst/>
+              <a:latin typeface="+mn-lt"/>
+              <a:ea typeface="+mn-ea"/>
+              <a:cs typeface="+mn-cs"/>
+            </a:endParaRPr>
+          </a:p>
+          <a:p>
+            <a:r>
+              <a:rPr lang="en-DK" sz="1200" i="1" kern="1200" dirty="0">
+                <a:solidFill>
+                  <a:schemeClr val="tx1"/>
+                </a:solidFill>
+                <a:effectLst/>
+                <a:latin typeface="+mn-lt"/>
+                <a:ea typeface="+mn-ea"/>
+                <a:cs typeface="+mn-cs"/>
+              </a:rPr>
+              <a:t> </a:t>
+            </a:r>
+            <a:endParaRPr lang="en-DK" sz="1200" kern="1200" dirty="0">
+              <a:solidFill>
+                <a:schemeClr val="tx1"/>
+              </a:solidFill>
+              <a:effectLst/>
+              <a:latin typeface="+mn-lt"/>
+              <a:ea typeface="+mn-ea"/>
+              <a:cs typeface="+mn-cs"/>
+            </a:endParaRPr>
+          </a:p>
+          <a:p>
+            <a:r>
+              <a:rPr lang="en-DK" sz="1200" kern="1200" dirty="0">
+                <a:solidFill>
+                  <a:schemeClr val="tx1"/>
+                </a:solidFill>
+                <a:effectLst/>
+                <a:latin typeface="+mn-lt"/>
+                <a:ea typeface="+mn-ea"/>
+                <a:cs typeface="+mn-cs"/>
+              </a:rPr>
+              <a:t> </a:t>
+            </a:r>
+          </a:p>
+          <a:p>
+            <a:r>
+              <a:rPr lang="en-DK" sz="1200" kern="1200" dirty="0">
+                <a:solidFill>
+                  <a:schemeClr val="tx1"/>
+                </a:solidFill>
+                <a:effectLst/>
+                <a:latin typeface="+mn-lt"/>
+                <a:ea typeface="+mn-ea"/>
+                <a:cs typeface="+mn-cs"/>
+              </a:rPr>
+              <a:t>Another strength is that it is easy experiment on. We can test out ideas and observe the results. For example, what do we expect to happen if the grass regrows </a:t>
+            </a:r>
+            <a:r>
+              <a:rPr lang="en-DK" sz="1200" i="1" kern="1200" dirty="0">
+                <a:solidFill>
+                  <a:schemeClr val="tx1"/>
+                </a:solidFill>
+                <a:effectLst/>
+                <a:latin typeface="+mn-lt"/>
+                <a:ea typeface="+mn-ea"/>
+                <a:cs typeface="+mn-cs"/>
+              </a:rPr>
+              <a:t>faster? </a:t>
+            </a:r>
+            <a:r>
+              <a:rPr lang="en-DK" sz="1200" kern="1200" dirty="0">
+                <a:solidFill>
+                  <a:schemeClr val="tx1"/>
+                </a:solidFill>
+                <a:effectLst/>
+                <a:latin typeface="+mn-lt"/>
+                <a:ea typeface="+mn-ea"/>
+                <a:cs typeface="+mn-cs"/>
+              </a:rPr>
+              <a:t>The results might very well surprise us! Because the outcomes of complex systems are indeed difficult to predict – but, ABM enables us not only to test out our ideas, but also helps us to think in longer causal chains and as a consequence make better predictions in the future.</a:t>
+            </a:r>
           </a:p>
         </p:txBody>
       </p:sp>
@@ -728,7 +1673,7 @@
               <a:pPr>
                 <a:defRPr/>
               </a:pPr>
-              <a:t>5</a:t>
+              <a:t>7</a:t>
             </a:fld>
             <a:endParaRPr lang="en-GB" dirty="0"/>
           </a:p>
@@ -747,7 +1692,7 @@
 </p:notes>
 </file>
 
-<file path=ppt/notesSlides/notesSlide4.xml><?xml version="1.0" encoding="utf-8"?>
+<file path=ppt/notesSlides/notesSlide8.xml><?xml version="1.0" encoding="utf-8"?>
 <p:notes xmlns:a="http://schemas.openxmlformats.org/drawingml/2006/main" xmlns:r="http://schemas.openxmlformats.org/officeDocument/2006/relationships" xmlns:p="http://schemas.openxmlformats.org/presentationml/2006/main">
   <p:cSld>
     <p:spTree>
@@ -986,7 +1931,7 @@
           <a:p>
             <a:fld id="{64B26858-E8C0-4C48-885F-CDC682789A1B}" type="datetimeFigureOut">
               <a:rPr lang="de-DE" smtClean="0"/>
-              <a:t>27.04.21</a:t>
+              <a:t>01.05.21</a:t>
             </a:fld>
             <a:endParaRPr lang="de-DE"/>
           </a:p>
@@ -1186,7 +2131,7 @@
           <a:p>
             <a:fld id="{64B26858-E8C0-4C48-885F-CDC682789A1B}" type="datetimeFigureOut">
               <a:rPr lang="de-DE" smtClean="0"/>
-              <a:t>27.04.21</a:t>
+              <a:t>01.05.21</a:t>
             </a:fld>
             <a:endParaRPr lang="de-DE"/>
           </a:p>
@@ -1396,7 +2341,7 @@
           <a:p>
             <a:fld id="{64B26858-E8C0-4C48-885F-CDC682789A1B}" type="datetimeFigureOut">
               <a:rPr lang="de-DE" smtClean="0"/>
-              <a:t>27.04.21</a:t>
+              <a:t>01.05.21</a:t>
             </a:fld>
             <a:endParaRPr lang="de-DE"/>
           </a:p>
@@ -2078,7 +3023,7 @@
             <a:fld id="{78417F83-4CBA-48F2-BAD0-783AE3701E32}" type="datetimeFigureOut">
               <a:rPr lang="da-DK" smtClean="0"/>
               <a:pPr/>
-              <a:t>27.04.2021</a:t>
+              <a:t>01.05.2021</a:t>
             </a:fld>
             <a:r>
               <a:rPr lang="da-DK" dirty="0"/>
@@ -2457,7 +3402,7 @@
             <a:fld id="{78417F83-4CBA-48F2-BAD0-783AE3701E32}" type="datetimeFigureOut">
               <a:rPr lang="da-DK" smtClean="0"/>
               <a:pPr/>
-              <a:t>27.04.2021</a:t>
+              <a:t>01.05.2021</a:t>
             </a:fld>
             <a:r>
               <a:rPr lang="da-DK" dirty="0"/>
@@ -2759,7 +3704,7 @@
             <a:fld id="{78417F83-4CBA-48F2-BAD0-783AE3701E32}" type="datetimeFigureOut">
               <a:rPr lang="da-DK" smtClean="0"/>
               <a:pPr/>
-              <a:t>27.04.2021</a:t>
+              <a:t>01.05.2021</a:t>
             </a:fld>
             <a:r>
               <a:rPr lang="da-DK" dirty="0"/>
@@ -2801,250 +3746,6 @@
 </file>
 
 <file path=ppt/slideLayouts/slideLayout15.xml><?xml version="1.0" encoding="utf-8"?>
-<p:sldLayout xmlns:a="http://schemas.openxmlformats.org/drawingml/2006/main" xmlns:r="http://schemas.openxmlformats.org/officeDocument/2006/relationships" xmlns:p="http://schemas.openxmlformats.org/presentationml/2006/main" userDrawn="1">
-  <p:cSld name="Quote slide">
-    <p:spTree>
-      <p:nvGrpSpPr>
-        <p:cNvPr id="1" name=""/>
-        <p:cNvGrpSpPr/>
-        <p:nvPr/>
-      </p:nvGrpSpPr>
-      <p:grpSpPr>
-        <a:xfrm>
-          <a:off x="0" y="0"/>
-          <a:ext cx="0" cy="0"/>
-          <a:chOff x="0" y="0"/>
-          <a:chExt cx="0" cy="0"/>
-        </a:xfrm>
-      </p:grpSpPr>
-      <p:sp>
-        <p:nvSpPr>
-          <p:cNvPr id="9" name="Hvid baggrund"/>
-          <p:cNvSpPr/>
-          <p:nvPr userDrawn="1"/>
-        </p:nvSpPr>
-        <p:spPr bwMode="auto">
-          <a:xfrm>
-            <a:off x="1" y="1"/>
-            <a:ext cx="12192000" cy="5897563"/>
-          </a:xfrm>
-          <a:prstGeom prst="rect">
-            <a:avLst/>
-          </a:prstGeom>
-          <a:solidFill>
-            <a:schemeClr val="bg1"/>
-          </a:solidFill>
-          <a:ln w="1778" cap="flat" cmpd="sng" algn="ctr">
-            <a:noFill/>
-            <a:prstDash val="solid"/>
-            <a:round/>
-            <a:headEnd type="none" w="med" len="med"/>
-            <a:tailEnd type="none" w="med" len="med"/>
-          </a:ln>
-          <a:effectLst/>
-        </p:spPr>
-        <p:txBody>
-          <a:bodyPr vert="horz" wrap="square" lIns="91440" tIns="45720" rIns="91440" bIns="45720" numCol="1" rtlCol="0" anchor="t" anchorCtr="0" compatLnSpc="1">
-            <a:prstTxWarp prst="textNoShape">
-              <a:avLst/>
-            </a:prstTxWarp>
-            <a:noAutofit/>
-          </a:bodyPr>
-          <a:lstStyle/>
-          <a:p>
-            <a:pPr marL="0" marR="0" indent="0" algn="l" defTabSz="914400" rtl="0" eaLnBrk="1" fontAlgn="base" latinLnBrk="0" hangingPunct="1">
-              <a:lnSpc>
-                <a:spcPct val="95000"/>
-              </a:lnSpc>
-              <a:spcBef>
-                <a:spcPct val="0"/>
-              </a:spcBef>
-              <a:spcAft>
-                <a:spcPct val="0"/>
-              </a:spcAft>
-              <a:buClrTx/>
-              <a:buSzTx/>
-              <a:buFont typeface="AU Passata" pitchFamily="34" charset="0"/>
-              <a:buNone/>
-              <a:tabLst/>
-            </a:pPr>
-            <a:endParaRPr kumimoji="0" lang="da-DK" sz="1600" b="0" i="0" u="none" strike="noStrike" cap="none" normalizeH="0" baseline="0" dirty="0" err="1">
-              <a:ln>
-                <a:noFill/>
-              </a:ln>
-              <a:solidFill>
-                <a:schemeClr val="bg1"/>
-              </a:solidFill>
-              <a:effectLst/>
-              <a:latin typeface="AU Passata" pitchFamily="34" charset="0"/>
-            </a:endParaRPr>
-          </a:p>
-        </p:txBody>
-      </p:sp>
-      <p:sp>
-        <p:nvSpPr>
-          <p:cNvPr id="10" name="Slide Number Placeholder 9"/>
-          <p:cNvSpPr>
-            <a:spLocks noGrp="1"/>
-          </p:cNvSpPr>
-          <p:nvPr>
-            <p:ph type="sldNum" sz="quarter" idx="15"/>
-          </p:nvPr>
-        </p:nvSpPr>
-        <p:spPr>
-          <a:xfrm>
-            <a:off x="11811068" y="6581497"/>
-            <a:ext cx="252066" cy="153888"/>
-          </a:xfrm>
-        </p:spPr>
-        <p:txBody>
-          <a:bodyPr/>
-          <a:lstStyle/>
-          <a:p>
-            <a:pPr>
-              <a:defRPr/>
-            </a:pPr>
-            <a:fld id="{E90C1E0A-682D-40DC-B1EA-26C007FDC330}" type="slidenum">
-              <a:rPr lang="da-DK" smtClean="0"/>
-              <a:pPr>
-                <a:defRPr/>
-              </a:pPr>
-              <a:t>‹#›</a:t>
-            </a:fld>
-            <a:endParaRPr lang="da-DK" dirty="0"/>
-          </a:p>
-        </p:txBody>
-      </p:sp>
-      <p:sp>
-        <p:nvSpPr>
-          <p:cNvPr id="6" name="Date Placeholder 5" hidden="1"/>
-          <p:cNvSpPr>
-            <a:spLocks noGrp="1"/>
-          </p:cNvSpPr>
-          <p:nvPr>
-            <p:ph type="dt" sz="half" idx="13"/>
-          </p:nvPr>
-        </p:nvSpPr>
-        <p:spPr/>
-        <p:txBody>
-          <a:bodyPr/>
-          <a:lstStyle/>
-          <a:p>
-            <a:fld id="{78417F83-4CBA-48F2-BAD0-783AE3701E32}" type="datetimeFigureOut">
-              <a:rPr lang="da-DK" smtClean="0"/>
-              <a:pPr/>
-              <a:t>27.04.2021</a:t>
-            </a:fld>
-            <a:r>
-              <a:rPr lang="da-DK" dirty="0"/>
-              <a:t>26-04-2021</a:t>
-            </a:r>
-          </a:p>
-        </p:txBody>
-      </p:sp>
-      <p:sp>
-        <p:nvSpPr>
-          <p:cNvPr id="8" name="Footer Placeholder 7" hidden="1"/>
-          <p:cNvSpPr>
-            <a:spLocks noGrp="1"/>
-          </p:cNvSpPr>
-          <p:nvPr>
-            <p:ph type="ftr" sz="quarter" idx="14"/>
-          </p:nvPr>
-        </p:nvSpPr>
-        <p:spPr/>
-        <p:txBody>
-          <a:bodyPr/>
-          <a:lstStyle/>
-          <a:p>
-            <a:endParaRPr lang="da-DK" dirty="0"/>
-          </a:p>
-        </p:txBody>
-      </p:sp>
-      <p:sp>
-        <p:nvSpPr>
-          <p:cNvPr id="11" name="Text Placeholder 61"/>
-          <p:cNvSpPr>
-            <a:spLocks noGrp="1"/>
-          </p:cNvSpPr>
-          <p:nvPr>
-            <p:ph type="body" sz="quarter" idx="16" hasCustomPrompt="1"/>
-          </p:nvPr>
-        </p:nvSpPr>
-        <p:spPr>
-          <a:xfrm>
-            <a:off x="1846421" y="1412776"/>
-            <a:ext cx="8499157" cy="3744416"/>
-          </a:xfrm>
-        </p:spPr>
-        <p:txBody>
-          <a:bodyPr/>
-          <a:lstStyle>
-            <a:lvl1pPr marL="432000" indent="-432000" algn="ctr">
-              <a:lnSpc>
-                <a:spcPct val="107000"/>
-              </a:lnSpc>
-              <a:buSzPct val="250000"/>
-              <a:buFontTx/>
-              <a:buBlip>
-                <a:blip r:embed="rId2"/>
-              </a:buBlip>
-              <a:defRPr sz="2800">
-                <a:latin typeface="Georgia" panose="02040502050405020303" pitchFamily="18" charset="0"/>
-              </a:defRPr>
-            </a:lvl1pPr>
-            <a:lvl2pPr marL="216000" indent="-216000" algn="ctr">
-              <a:lnSpc>
-                <a:spcPct val="99000"/>
-              </a:lnSpc>
-              <a:buFont typeface="Arial" panose="020B0604020202020204" pitchFamily="34" charset="0"/>
-              <a:buChar char="-"/>
-              <a:defRPr sz="2000" cap="all" baseline="0">
-                <a:latin typeface="Georgia" panose="02040502050405020303" pitchFamily="18" charset="0"/>
-              </a:defRPr>
-            </a:lvl2pPr>
-            <a:lvl3pPr algn="ctr">
-              <a:buFontTx/>
-              <a:buNone/>
-              <a:defRPr/>
-            </a:lvl3pPr>
-          </a:lstStyle>
-          <a:p>
-            <a:pPr lvl="0"/>
-            <a:r>
-              <a:rPr lang="da-DK" dirty="0"/>
-              <a:t>Click to add Quote text, for next level ENTER and TAB</a:t>
-            </a:r>
-            <a:endParaRPr lang="da-DK"/>
-          </a:p>
-          <a:p>
-            <a:pPr lvl="1"/>
-            <a:r>
-              <a:rPr lang="da-DK" dirty="0"/>
-              <a:t>Second level</a:t>
-            </a:r>
-            <a:endParaRPr lang="da-DK"/>
-          </a:p>
-          <a:p>
-            <a:pPr lvl="2"/>
-            <a:endParaRPr lang="da-DK" dirty="0"/>
-          </a:p>
-        </p:txBody>
-      </p:sp>
-    </p:spTree>
-    <p:extLst>
-      <p:ext uri="{BB962C8B-B14F-4D97-AF65-F5344CB8AC3E}">
-        <p14:creationId xmlns:p14="http://schemas.microsoft.com/office/powerpoint/2010/main" val="1604646389"/>
-      </p:ext>
-    </p:extLst>
-  </p:cSld>
-  <p:clrMapOvr>
-    <a:masterClrMapping/>
-  </p:clrMapOvr>
-</p:sldLayout>
-</file>
-
-<file path=ppt/slideLayouts/slideLayout16.xml><?xml version="1.0" encoding="utf-8"?>
 <p:sldLayout xmlns:a="http://schemas.openxmlformats.org/drawingml/2006/main" xmlns:r="http://schemas.openxmlformats.org/officeDocument/2006/relationships" xmlns:p="http://schemas.openxmlformats.org/presentationml/2006/main" showMasterSp="0" userDrawn="1">
   <p:cSld name="End slide Aarhus Universitet">
     <p:bg>
@@ -3233,7 +3934,7 @@
             <a:fld id="{78417F83-4CBA-48F2-BAD0-783AE3701E32}" type="datetimeFigureOut">
               <a:rPr lang="da-DK" smtClean="0"/>
               <a:pPr/>
-              <a:t>27.04.2021</a:t>
+              <a:t>01.05.2021</a:t>
             </a:fld>
             <a:r>
               <a:rPr lang="da-DK" dirty="0"/>
@@ -3446,7 +4147,7 @@
           <a:p>
             <a:fld id="{64B26858-E8C0-4C48-885F-CDC682789A1B}" type="datetimeFigureOut">
               <a:rPr lang="de-DE" smtClean="0"/>
-              <a:t>27.04.21</a:t>
+              <a:t>01.05.21</a:t>
             </a:fld>
             <a:endParaRPr lang="de-DE"/>
           </a:p>
@@ -3722,7 +4423,7 @@
           <a:p>
             <a:fld id="{64B26858-E8C0-4C48-885F-CDC682789A1B}" type="datetimeFigureOut">
               <a:rPr lang="de-DE" smtClean="0"/>
-              <a:t>27.04.21</a:t>
+              <a:t>01.05.21</a:t>
             </a:fld>
             <a:endParaRPr lang="de-DE"/>
           </a:p>
@@ -3990,7 +4691,7 @@
           <a:p>
             <a:fld id="{64B26858-E8C0-4C48-885F-CDC682789A1B}" type="datetimeFigureOut">
               <a:rPr lang="de-DE" smtClean="0"/>
-              <a:t>27.04.21</a:t>
+              <a:t>01.05.21</a:t>
             </a:fld>
             <a:endParaRPr lang="de-DE"/>
           </a:p>
@@ -4405,7 +5106,7 @@
           <a:p>
             <a:fld id="{64B26858-E8C0-4C48-885F-CDC682789A1B}" type="datetimeFigureOut">
               <a:rPr lang="de-DE" smtClean="0"/>
-              <a:t>27.04.21</a:t>
+              <a:t>01.05.21</a:t>
             </a:fld>
             <a:endParaRPr lang="de-DE"/>
           </a:p>
@@ -4547,7 +5248,7 @@
           <a:p>
             <a:fld id="{64B26858-E8C0-4C48-885F-CDC682789A1B}" type="datetimeFigureOut">
               <a:rPr lang="de-DE" smtClean="0"/>
-              <a:t>27.04.21</a:t>
+              <a:t>01.05.21</a:t>
             </a:fld>
             <a:endParaRPr lang="de-DE"/>
           </a:p>
@@ -4660,7 +5361,7 @@
           <a:p>
             <a:fld id="{64B26858-E8C0-4C48-885F-CDC682789A1B}" type="datetimeFigureOut">
               <a:rPr lang="de-DE" smtClean="0"/>
-              <a:t>27.04.21</a:t>
+              <a:t>01.05.21</a:t>
             </a:fld>
             <a:endParaRPr lang="de-DE"/>
           </a:p>
@@ -4973,7 +5674,7 @@
           <a:p>
             <a:fld id="{64B26858-E8C0-4C48-885F-CDC682789A1B}" type="datetimeFigureOut">
               <a:rPr lang="de-DE" smtClean="0"/>
-              <a:t>27.04.21</a:t>
+              <a:t>01.05.21</a:t>
             </a:fld>
             <a:endParaRPr lang="de-DE"/>
           </a:p>
@@ -5262,7 +5963,7 @@
           <a:p>
             <a:fld id="{64B26858-E8C0-4C48-885F-CDC682789A1B}" type="datetimeFigureOut">
               <a:rPr lang="de-DE" smtClean="0"/>
-              <a:t>27.04.21</a:t>
+              <a:t>01.05.21</a:t>
             </a:fld>
             <a:endParaRPr lang="de-DE"/>
           </a:p>
@@ -5505,7 +6206,7 @@
           <a:p>
             <a:fld id="{64B26858-E8C0-4C48-885F-CDC682789A1B}" type="datetimeFigureOut">
               <a:rPr lang="de-DE" smtClean="0"/>
-              <a:t>27.04.21</a:t>
+              <a:t>01.05.21</a:t>
             </a:fld>
             <a:endParaRPr lang="de-DE"/>
           </a:p>
@@ -5624,8 +6325,7 @@
     <p:sldLayoutId id="2147483660" r:id="rId12"/>
     <p:sldLayoutId id="2147483661" r:id="rId13"/>
     <p:sldLayoutId id="2147483662" r:id="rId14"/>
-    <p:sldLayoutId id="2147483663" r:id="rId15"/>
-    <p:sldLayoutId id="2147483664" r:id="rId16"/>
+    <p:sldLayoutId id="2147483664" r:id="rId15"/>
   </p:sldLayoutIdLst>
   <p:txStyles>
     <p:titleStyle>
@@ -5939,8 +6639,8 @@
         </p:nvSpPr>
         <p:spPr>
           <a:xfrm>
-            <a:off x="987427" y="2436178"/>
-            <a:ext cx="10220325" cy="1754326"/>
+            <a:off x="987427" y="2519278"/>
+            <a:ext cx="10220325" cy="1588127"/>
           </a:xfrm>
         </p:spPr>
         <p:txBody>
@@ -5949,35 +6649,20 @@
           <a:p>
             <a:r>
               <a:rPr lang="da-DK" dirty="0"/>
-              <a:t>Agent-</a:t>
-            </a:r>
-            <a:r>
-              <a:rPr lang="da-DK" dirty="0" err="1"/>
-              <a:t>Based</a:t>
-            </a:r>
-            <a:r>
-              <a:rPr lang="da-DK" dirty="0"/>
-              <a:t> </a:t>
-            </a:r>
-            <a:r>
-              <a:rPr lang="da-DK" dirty="0" err="1"/>
-              <a:t>Modeling</a:t>
+              <a:t>EDU-IT</a:t>
             </a:r>
             <a:br>
               <a:rPr lang="da-DK" dirty="0"/>
             </a:br>
             <a:r>
-              <a:rPr lang="da-DK" dirty="0"/>
-              <a:t>&amp; </a:t>
-            </a:r>
-            <a:r>
-              <a:rPr lang="da-DK" dirty="0" err="1"/>
-              <a:t>Complex</a:t>
-            </a:r>
-            <a:r>
-              <a:rPr lang="da-DK" dirty="0"/>
-              <a:t> Systems</a:t>
-            </a:r>
+              <a:rPr lang="da-DK" sz="4400" b="1" dirty="0"/>
+              <a:t>Science at Home, Aarhus </a:t>
+            </a:r>
+            <a:r>
+              <a:rPr lang="da-DK" sz="4400" b="1" dirty="0" err="1"/>
+              <a:t>University</a:t>
+            </a:r>
+            <a:endParaRPr lang="da-DK" b="1" dirty="0"/>
           </a:p>
         </p:txBody>
       </p:sp>
@@ -6029,7 +6714,25 @@
           <a:bodyPr/>
           <a:lstStyle/>
           <a:p>
-            <a:endParaRPr lang="da-DK" dirty="0"/>
+            <a:r>
+              <a:rPr lang="da-DK" dirty="0"/>
+              <a:t>Agent-</a:t>
+            </a:r>
+            <a:r>
+              <a:rPr lang="da-DK" dirty="0" err="1"/>
+              <a:t>Based</a:t>
+            </a:r>
+            <a:r>
+              <a:rPr lang="da-DK" dirty="0"/>
+              <a:t> Models:</a:t>
+            </a:r>
+            <a:br>
+              <a:rPr lang="da-DK" dirty="0"/>
+            </a:br>
+            <a:r>
+              <a:rPr lang="da-DK" b="1" dirty="0"/>
+              <a:t>The Virtual Laboratory</a:t>
+            </a:r>
           </a:p>
         </p:txBody>
       </p:sp>
@@ -6048,7 +6751,26 @@
           <a:bodyPr/>
           <a:lstStyle/>
           <a:p>
-            <a:endParaRPr lang="da-DK" dirty="0"/>
+            <a:r>
+              <a:rPr lang="da-DK" dirty="0"/>
+              <a:t>[</a:t>
+            </a:r>
+            <a:r>
+              <a:rPr lang="da-DK" dirty="0" err="1"/>
+              <a:t>add</a:t>
+            </a:r>
+            <a:r>
+              <a:rPr lang="da-DK" dirty="0"/>
+              <a:t> images for </a:t>
+            </a:r>
+            <a:r>
+              <a:rPr lang="da-DK" dirty="0" err="1"/>
+              <a:t>visuals</a:t>
+            </a:r>
+            <a:r>
+              <a:rPr lang="da-DK" dirty="0"/>
+              <a:t>]</a:t>
+            </a:r>
           </a:p>
         </p:txBody>
       </p:sp>
@@ -6101,8 +6823,546 @@
           <a:lstStyle/>
           <a:p>
             <a:r>
+              <a:rPr lang="de-DE" dirty="0" err="1"/>
+              <a:t>Collaboration</a:t>
+            </a:r>
+            <a:r>
+              <a:rPr lang="de-DE" dirty="0"/>
+              <a:t> Partners</a:t>
+            </a:r>
+            <a:endParaRPr lang="da-DK" dirty="0"/>
+          </a:p>
+        </p:txBody>
+      </p:sp>
+      <p:sp>
+        <p:nvSpPr>
+          <p:cNvPr id="5" name="Content Placeholder 4"/>
+          <p:cNvSpPr>
+            <a:spLocks noGrp="1"/>
+          </p:cNvSpPr>
+          <p:nvPr>
+            <p:ph idx="1"/>
+          </p:nvPr>
+        </p:nvSpPr>
+        <p:spPr>
+          <a:xfrm>
+            <a:off x="7506790" y="1433982"/>
+            <a:ext cx="3546716" cy="4521366"/>
+          </a:xfrm>
+        </p:spPr>
+        <p:txBody>
+          <a:bodyPr/>
+          <a:lstStyle/>
+          <a:p>
+            <a:r>
+              <a:rPr lang="da-DK" dirty="0" err="1"/>
+              <a:t>Linguistics</a:t>
+            </a:r>
+            <a:endParaRPr lang="da-DK" dirty="0"/>
+          </a:p>
+          <a:p>
+            <a:r>
+              <a:rPr lang="da-DK" sz="1800" dirty="0"/>
+              <a:t>[</a:t>
+            </a:r>
+            <a:r>
+              <a:rPr lang="da-DK" sz="1800" dirty="0" err="1"/>
+              <a:t>insert</a:t>
+            </a:r>
+            <a:r>
+              <a:rPr lang="da-DK" sz="1800" dirty="0"/>
+              <a:t> </a:t>
+            </a:r>
+            <a:r>
+              <a:rPr lang="da-DK" sz="1800" dirty="0" err="1"/>
+              <a:t>big</a:t>
+            </a:r>
+            <a:r>
+              <a:rPr lang="da-DK" sz="1800" dirty="0"/>
+              <a:t> </a:t>
+            </a:r>
+            <a:r>
+              <a:rPr lang="da-DK" sz="1800" dirty="0" err="1"/>
+              <a:t>question</a:t>
+            </a:r>
+            <a:r>
+              <a:rPr lang="da-DK" sz="1800" dirty="0"/>
+              <a:t> </a:t>
+            </a:r>
+            <a:r>
+              <a:rPr lang="da-DK" sz="1800" dirty="0" err="1"/>
+              <a:t>here</a:t>
+            </a:r>
+            <a:r>
+              <a:rPr lang="da-DK" sz="1800" dirty="0"/>
+              <a:t>]?</a:t>
+            </a:r>
+          </a:p>
+          <a:p>
+            <a:endParaRPr lang="da-DK" dirty="0"/>
+          </a:p>
+          <a:p>
+            <a:endParaRPr lang="da-DK" dirty="0"/>
+          </a:p>
+        </p:txBody>
+      </p:sp>
+      <p:pic>
+        <p:nvPicPr>
+          <p:cNvPr id="6" name="Billede 6">
+            <a:extLst>
+              <a:ext uri="{FF2B5EF4-FFF2-40B4-BE49-F238E27FC236}">
+                <a16:creationId xmlns:a16="http://schemas.microsoft.com/office/drawing/2014/main" id="{7DA184C1-807B-614E-8BCE-1A7CDA11B351}"/>
+              </a:ext>
+            </a:extLst>
+          </p:cNvPr>
+          <p:cNvPicPr>
+            <a:picLocks noChangeAspect="1"/>
+          </p:cNvPicPr>
+          <p:nvPr/>
+        </p:nvPicPr>
+        <p:blipFill rotWithShape="1">
+          <a:blip r:embed="rId4"/>
+          <a:srcRect r="56227"/>
+          <a:stretch/>
+        </p:blipFill>
+        <p:spPr>
+          <a:xfrm>
+            <a:off x="315995" y="2354307"/>
+            <a:ext cx="4807684" cy="3601041"/>
+          </a:xfrm>
+          <a:prstGeom prst="rect">
+            <a:avLst/>
+          </a:prstGeom>
+        </p:spPr>
+      </p:pic>
+      <p:sp>
+        <p:nvSpPr>
+          <p:cNvPr id="7" name="Content Placeholder 4">
+            <a:extLst>
+              <a:ext uri="{FF2B5EF4-FFF2-40B4-BE49-F238E27FC236}">
+                <a16:creationId xmlns:a16="http://schemas.microsoft.com/office/drawing/2014/main" id="{B9C0807D-3C29-1B4B-824B-A84E3A0A2010}"/>
+              </a:ext>
+            </a:extLst>
+          </p:cNvPr>
+          <p:cNvSpPr txBox="1">
+            <a:spLocks/>
+          </p:cNvSpPr>
+          <p:nvPr/>
+        </p:nvSpPr>
+        <p:spPr>
+          <a:xfrm>
+            <a:off x="1138496" y="1433981"/>
+            <a:ext cx="3546716" cy="5103951"/>
+          </a:xfrm>
+          <a:prstGeom prst="rect">
+            <a:avLst/>
+          </a:prstGeom>
+        </p:spPr>
+        <p:txBody>
+          <a:bodyPr vert="horz" lIns="91440" tIns="45720" rIns="91440" bIns="45720" rtlCol="0">
+            <a:normAutofit/>
+          </a:bodyPr>
+          <a:lstStyle>
+            <a:lvl1pPr marL="0" indent="0" algn="l" defTabSz="914400" rtl="0" eaLnBrk="1" latinLnBrk="0" hangingPunct="1">
+              <a:lnSpc>
+                <a:spcPct val="90000"/>
+              </a:lnSpc>
+              <a:spcBef>
+                <a:spcPts val="1000"/>
+              </a:spcBef>
+              <a:buFont typeface="Calibri" panose="020F0502020204030204" pitchFamily="34" charset="0"/>
+              <a:buChar char="​"/>
+              <a:defRPr sz="2800" kern="1200">
+                <a:solidFill>
+                  <a:schemeClr val="tx1"/>
+                </a:solidFill>
+                <a:latin typeface="+mn-lt"/>
+                <a:ea typeface="+mn-ea"/>
+                <a:cs typeface="+mn-cs"/>
+              </a:defRPr>
+            </a:lvl1pPr>
+            <a:lvl2pPr marL="685800" indent="-228600" algn="l" defTabSz="914400" rtl="0" eaLnBrk="1" latinLnBrk="0" hangingPunct="1">
+              <a:lnSpc>
+                <a:spcPct val="90000"/>
+              </a:lnSpc>
+              <a:spcBef>
+                <a:spcPts val="500"/>
+              </a:spcBef>
+              <a:buFont typeface="Arial" panose="020B0604020202020204" pitchFamily="34" charset="0"/>
+              <a:buChar char="•"/>
+              <a:defRPr sz="2400" kern="1200">
+                <a:solidFill>
+                  <a:schemeClr val="tx1"/>
+                </a:solidFill>
+                <a:latin typeface="+mn-lt"/>
+                <a:ea typeface="+mn-ea"/>
+                <a:cs typeface="+mn-cs"/>
+              </a:defRPr>
+            </a:lvl2pPr>
+            <a:lvl3pPr marL="1143000" indent="-228600" algn="l" defTabSz="914400" rtl="0" eaLnBrk="1" latinLnBrk="0" hangingPunct="1">
+              <a:lnSpc>
+                <a:spcPct val="90000"/>
+              </a:lnSpc>
+              <a:spcBef>
+                <a:spcPts val="500"/>
+              </a:spcBef>
+              <a:buFont typeface="Arial" panose="020B0604020202020204" pitchFamily="34" charset="0"/>
+              <a:buChar char="•"/>
+              <a:defRPr sz="2000" kern="1200">
+                <a:solidFill>
+                  <a:schemeClr val="tx1"/>
+                </a:solidFill>
+                <a:latin typeface="+mn-lt"/>
+                <a:ea typeface="+mn-ea"/>
+                <a:cs typeface="+mn-cs"/>
+              </a:defRPr>
+            </a:lvl3pPr>
+            <a:lvl4pPr marL="1600200" indent="-228600" algn="l" defTabSz="914400" rtl="0" eaLnBrk="1" latinLnBrk="0" hangingPunct="1">
+              <a:lnSpc>
+                <a:spcPct val="90000"/>
+              </a:lnSpc>
+              <a:spcBef>
+                <a:spcPts val="500"/>
+              </a:spcBef>
+              <a:buFont typeface="Arial" panose="020B0604020202020204" pitchFamily="34" charset="0"/>
+              <a:buChar char="•"/>
+              <a:defRPr sz="1800" kern="1200">
+                <a:solidFill>
+                  <a:schemeClr val="tx1"/>
+                </a:solidFill>
+                <a:latin typeface="+mn-lt"/>
+                <a:ea typeface="+mn-ea"/>
+                <a:cs typeface="+mn-cs"/>
+              </a:defRPr>
+            </a:lvl4pPr>
+            <a:lvl5pPr marL="2057400" indent="-228600" algn="l" defTabSz="914400" rtl="0" eaLnBrk="1" latinLnBrk="0" hangingPunct="1">
+              <a:lnSpc>
+                <a:spcPct val="90000"/>
+              </a:lnSpc>
+              <a:spcBef>
+                <a:spcPts val="500"/>
+              </a:spcBef>
+              <a:buFont typeface="Arial" panose="020B0604020202020204" pitchFamily="34" charset="0"/>
+              <a:buChar char="•"/>
+              <a:defRPr sz="1800" kern="1200">
+                <a:solidFill>
+                  <a:schemeClr val="tx1"/>
+                </a:solidFill>
+                <a:latin typeface="+mn-lt"/>
+                <a:ea typeface="+mn-ea"/>
+                <a:cs typeface="+mn-cs"/>
+              </a:defRPr>
+            </a:lvl5pPr>
+            <a:lvl6pPr marL="2514600" indent="-228600" algn="l" defTabSz="914400" rtl="0" eaLnBrk="1" latinLnBrk="0" hangingPunct="1">
+              <a:lnSpc>
+                <a:spcPct val="90000"/>
+              </a:lnSpc>
+              <a:spcBef>
+                <a:spcPts val="500"/>
+              </a:spcBef>
+              <a:buFont typeface="Arial" panose="020B0604020202020204" pitchFamily="34" charset="0"/>
+              <a:buChar char="•"/>
+              <a:defRPr sz="1800" kern="1200">
+                <a:solidFill>
+                  <a:schemeClr val="tx1"/>
+                </a:solidFill>
+                <a:latin typeface="+mn-lt"/>
+                <a:ea typeface="+mn-ea"/>
+                <a:cs typeface="+mn-cs"/>
+              </a:defRPr>
+            </a:lvl6pPr>
+            <a:lvl7pPr marL="2971800" indent="-228600" algn="l" defTabSz="914400" rtl="0" eaLnBrk="1" latinLnBrk="0" hangingPunct="1">
+              <a:lnSpc>
+                <a:spcPct val="90000"/>
+              </a:lnSpc>
+              <a:spcBef>
+                <a:spcPts val="500"/>
+              </a:spcBef>
+              <a:buFont typeface="Arial" panose="020B0604020202020204" pitchFamily="34" charset="0"/>
+              <a:buChar char="•"/>
+              <a:defRPr sz="1800" kern="1200">
+                <a:solidFill>
+                  <a:schemeClr val="tx1"/>
+                </a:solidFill>
+                <a:latin typeface="+mn-lt"/>
+                <a:ea typeface="+mn-ea"/>
+                <a:cs typeface="+mn-cs"/>
+              </a:defRPr>
+            </a:lvl7pPr>
+            <a:lvl8pPr marL="3429000" indent="-228600" algn="l" defTabSz="914400" rtl="0" eaLnBrk="1" latinLnBrk="0" hangingPunct="1">
+              <a:lnSpc>
+                <a:spcPct val="90000"/>
+              </a:lnSpc>
+              <a:spcBef>
+                <a:spcPts val="500"/>
+              </a:spcBef>
+              <a:buFont typeface="Arial" panose="020B0604020202020204" pitchFamily="34" charset="0"/>
+              <a:buChar char="•"/>
+              <a:defRPr sz="1800" kern="1200">
+                <a:solidFill>
+                  <a:schemeClr val="tx1"/>
+                </a:solidFill>
+                <a:latin typeface="+mn-lt"/>
+                <a:ea typeface="+mn-ea"/>
+                <a:cs typeface="+mn-cs"/>
+              </a:defRPr>
+            </a:lvl8pPr>
+            <a:lvl9pPr marL="3886200" indent="-228600" algn="l" defTabSz="914400" rtl="0" eaLnBrk="1" latinLnBrk="0" hangingPunct="1">
+              <a:lnSpc>
+                <a:spcPct val="90000"/>
+              </a:lnSpc>
+              <a:spcBef>
+                <a:spcPts val="500"/>
+              </a:spcBef>
+              <a:buFont typeface="Arial" panose="020B0604020202020204" pitchFamily="34" charset="0"/>
+              <a:buChar char="•"/>
+              <a:defRPr sz="1800" kern="1200">
+                <a:solidFill>
+                  <a:schemeClr val="tx1"/>
+                </a:solidFill>
+                <a:latin typeface="+mn-lt"/>
+                <a:ea typeface="+mn-ea"/>
+                <a:cs typeface="+mn-cs"/>
+              </a:defRPr>
+            </a:lvl9pPr>
+          </a:lstStyle>
+          <a:p>
+            <a:r>
+              <a:rPr lang="da-DK" dirty="0" err="1"/>
+              <a:t>Theory</a:t>
+            </a:r>
+            <a:r>
+              <a:rPr lang="da-DK" dirty="0"/>
+              <a:t> of Science</a:t>
+            </a:r>
+          </a:p>
+          <a:p>
+            <a:r>
+              <a:rPr lang="da-DK" sz="1800" dirty="0"/>
+              <a:t>[</a:t>
+            </a:r>
+            <a:r>
+              <a:rPr lang="da-DK" sz="1800" dirty="0" err="1"/>
+              <a:t>insert</a:t>
+            </a:r>
+            <a:r>
+              <a:rPr lang="da-DK" sz="1800" dirty="0"/>
+              <a:t> </a:t>
+            </a:r>
+            <a:r>
+              <a:rPr lang="da-DK" sz="1800" dirty="0" err="1"/>
+              <a:t>big</a:t>
+            </a:r>
+            <a:r>
+              <a:rPr lang="da-DK" sz="1800" dirty="0"/>
+              <a:t> </a:t>
+            </a:r>
+            <a:r>
+              <a:rPr lang="da-DK" sz="1800" dirty="0" err="1"/>
+              <a:t>question</a:t>
+            </a:r>
+            <a:r>
+              <a:rPr lang="da-DK" sz="1800" dirty="0"/>
+              <a:t> </a:t>
+            </a:r>
+            <a:r>
+              <a:rPr lang="da-DK" sz="1800" dirty="0" err="1"/>
+              <a:t>here</a:t>
+            </a:r>
+            <a:r>
+              <a:rPr lang="da-DK" sz="1800" dirty="0"/>
+              <a:t>]?</a:t>
+            </a:r>
+          </a:p>
+        </p:txBody>
+      </p:sp>
+      <p:pic>
+        <p:nvPicPr>
+          <p:cNvPr id="3" name="Picture 2">
+            <a:extLst>
+              <a:ext uri="{FF2B5EF4-FFF2-40B4-BE49-F238E27FC236}">
+                <a16:creationId xmlns:a16="http://schemas.microsoft.com/office/drawing/2014/main" id="{D8A3CCA6-BD49-9C4E-A0C0-D1577BB9CD47}"/>
+              </a:ext>
+            </a:extLst>
+          </p:cNvPr>
+          <p:cNvPicPr>
+            <a:picLocks noChangeAspect="1"/>
+          </p:cNvPicPr>
+          <p:nvPr/>
+        </p:nvPicPr>
+        <p:blipFill rotWithShape="1">
+          <a:blip r:embed="rId5"/>
+          <a:srcRect l="8626" r="5657"/>
+          <a:stretch/>
+        </p:blipFill>
+        <p:spPr>
+          <a:xfrm>
+            <a:off x="5507713" y="2354307"/>
+            <a:ext cx="6245820" cy="3494844"/>
+          </a:xfrm>
+          <a:prstGeom prst="rect">
+            <a:avLst/>
+          </a:prstGeom>
+        </p:spPr>
+      </p:pic>
+    </p:spTree>
+    <p:custDataLst>
+      <p:tags r:id="rId1"/>
+    </p:custDataLst>
+    <p:extLst>
+      <p:ext uri="{BB962C8B-B14F-4D97-AF65-F5344CB8AC3E}">
+        <p14:creationId xmlns:p14="http://schemas.microsoft.com/office/powerpoint/2010/main" val="961252846"/>
+      </p:ext>
+    </p:extLst>
+  </p:cSld>
+  <p:clrMapOvr>
+    <a:masterClrMapping/>
+  </p:clrMapOvr>
+</p:sld>
+</file>
+
+<file path=ppt/slides/slide4.xml><?xml version="1.0" encoding="utf-8"?>
+<p:sld xmlns:a="http://schemas.openxmlformats.org/drawingml/2006/main" xmlns:r="http://schemas.openxmlformats.org/officeDocument/2006/relationships" xmlns:p="http://schemas.openxmlformats.org/presentationml/2006/main">
+  <p:cSld>
+    <p:spTree>
+      <p:nvGrpSpPr>
+        <p:cNvPr id="1" name=""/>
+        <p:cNvGrpSpPr/>
+        <p:nvPr/>
+      </p:nvGrpSpPr>
+      <p:grpSpPr>
+        <a:xfrm>
+          <a:off x="0" y="0"/>
+          <a:ext cx="0" cy="0"/>
+          <a:chOff x="0" y="0"/>
+          <a:chExt cx="0" cy="0"/>
+        </a:xfrm>
+      </p:grpSpPr>
+      <p:sp>
+        <p:nvSpPr>
+          <p:cNvPr id="4" name="Title 3"/>
+          <p:cNvSpPr>
+            <a:spLocks noGrp="1"/>
+          </p:cNvSpPr>
+          <p:nvPr>
+            <p:ph type="title"/>
+          </p:nvPr>
+        </p:nvSpPr>
+        <p:spPr/>
+        <p:txBody>
+          <a:bodyPr/>
+          <a:lstStyle/>
+          <a:p>
+            <a:r>
+              <a:rPr lang="de-DE" dirty="0"/>
+              <a:t>Agent-</a:t>
+            </a:r>
+            <a:r>
+              <a:rPr lang="de-DE" dirty="0" err="1"/>
+              <a:t>Based</a:t>
+            </a:r>
+            <a:r>
+              <a:rPr lang="de-DE" dirty="0"/>
+              <a:t> Models</a:t>
+            </a:r>
+            <a:endParaRPr lang="da-DK" dirty="0"/>
+          </a:p>
+        </p:txBody>
+      </p:sp>
+      <p:sp>
+        <p:nvSpPr>
+          <p:cNvPr id="5" name="Content Placeholder 4"/>
+          <p:cNvSpPr>
+            <a:spLocks noGrp="1"/>
+          </p:cNvSpPr>
+          <p:nvPr>
+            <p:ph idx="1"/>
+          </p:nvPr>
+        </p:nvSpPr>
+        <p:spPr>
+          <a:xfrm>
+            <a:off x="868680" y="1433982"/>
+            <a:ext cx="10184826" cy="4521366"/>
+          </a:xfrm>
+        </p:spPr>
+        <p:txBody>
+          <a:bodyPr/>
+          <a:lstStyle/>
+          <a:p>
+            <a:r>
+              <a:rPr lang="da-DK" dirty="0"/>
+              <a:t>[</a:t>
+            </a:r>
+            <a:r>
+              <a:rPr lang="da-DK" dirty="0" err="1"/>
+              <a:t>insert</a:t>
+            </a:r>
+            <a:r>
+              <a:rPr lang="da-DK" dirty="0"/>
+              <a:t> </a:t>
+            </a:r>
+            <a:r>
+              <a:rPr lang="da-DK" dirty="0" err="1"/>
+              <a:t>visuals</a:t>
+            </a:r>
+            <a:r>
+              <a:rPr lang="da-DK" dirty="0"/>
+              <a:t>]</a:t>
+            </a:r>
+          </a:p>
+        </p:txBody>
+      </p:sp>
+    </p:spTree>
+    <p:custDataLst>
+      <p:tags r:id="rId1"/>
+    </p:custDataLst>
+    <p:extLst>
+      <p:ext uri="{BB962C8B-B14F-4D97-AF65-F5344CB8AC3E}">
+        <p14:creationId xmlns:p14="http://schemas.microsoft.com/office/powerpoint/2010/main" val="4209431211"/>
+      </p:ext>
+    </p:extLst>
+  </p:cSld>
+  <p:clrMapOvr>
+    <a:masterClrMapping/>
+  </p:clrMapOvr>
+</p:sld>
+</file>
+
+<file path=ppt/slides/slide5.xml><?xml version="1.0" encoding="utf-8"?>
+<p:sld xmlns:a="http://schemas.openxmlformats.org/drawingml/2006/main" xmlns:r="http://schemas.openxmlformats.org/officeDocument/2006/relationships" xmlns:p="http://schemas.openxmlformats.org/presentationml/2006/main">
+  <p:cSld>
+    <p:spTree>
+      <p:nvGrpSpPr>
+        <p:cNvPr id="1" name=""/>
+        <p:cNvGrpSpPr/>
+        <p:nvPr/>
+      </p:nvGrpSpPr>
+      <p:grpSpPr>
+        <a:xfrm>
+          <a:off x="0" y="0"/>
+          <a:ext cx="0" cy="0"/>
+          <a:chOff x="0" y="0"/>
+          <a:chExt cx="0" cy="0"/>
+        </a:xfrm>
+      </p:grpSpPr>
+      <p:sp>
+        <p:nvSpPr>
+          <p:cNvPr id="4" name="Title 3"/>
+          <p:cNvSpPr>
+            <a:spLocks noGrp="1"/>
+          </p:cNvSpPr>
+          <p:nvPr>
+            <p:ph type="title"/>
+          </p:nvPr>
+        </p:nvSpPr>
+        <p:spPr/>
+        <p:txBody>
+          <a:bodyPr/>
+          <a:lstStyle/>
+          <a:p>
+            <a:r>
               <a:rPr lang="en-US" dirty="0"/>
-              <a:t>example of </a:t>
+              <a:t>Example of a </a:t>
             </a:r>
             <a:r>
               <a:rPr lang="en-US" b="1" u="sng" dirty="0"/>
@@ -6651,7 +7911,7 @@
 </p:sld>
 </file>
 
-<file path=ppt/slides/slide4.xml><?xml version="1.0" encoding="utf-8"?>
+<file path=ppt/slides/slide6.xml><?xml version="1.0" encoding="utf-8"?>
 <p:sld xmlns:a="http://schemas.openxmlformats.org/drawingml/2006/main" xmlns:r="http://schemas.openxmlformats.org/officeDocument/2006/relationships" xmlns:p="http://schemas.openxmlformats.org/presentationml/2006/main">
   <p:cSld>
     <p:spTree>
@@ -6684,12 +7944,24 @@
           <a:lstStyle/>
           <a:p>
             <a:r>
+              <a:rPr lang="da-DK" dirty="0"/>
+              <a:t>[</a:t>
+            </a:r>
+            <a:r>
               <a:rPr lang="da-DK" dirty="0" err="1"/>
               <a:t>Running</a:t>
             </a:r>
             <a:r>
               <a:rPr lang="da-DK" dirty="0"/>
-              <a:t> model</a:t>
+              <a:t> model in </a:t>
+            </a:r>
+            <a:r>
+              <a:rPr lang="da-DK" dirty="0" err="1"/>
+              <a:t>Netlogo</a:t>
+            </a:r>
+            <a:r>
+              <a:rPr lang="da-DK" dirty="0"/>
+              <a:t> for Preview]</a:t>
             </a:r>
           </a:p>
         </p:txBody>
@@ -6715,16 +7987,14 @@
       </p:sp>
       <p:pic>
         <p:nvPicPr>
-          <p:cNvPr id="2" name="Picture 1">
+          <p:cNvPr id="6" name="Picture 5">
             <a:extLst>
               <a:ext uri="{FF2B5EF4-FFF2-40B4-BE49-F238E27FC236}">
-                <a16:creationId xmlns:a16="http://schemas.microsoft.com/office/drawing/2014/main" id="{90B04147-AD4A-6D44-9644-F43A7F033E6C}"/>
+                <a16:creationId xmlns:a16="http://schemas.microsoft.com/office/drawing/2014/main" id="{30AB7F78-D522-ED46-AB2D-28B14B6FCE71}"/>
               </a:ext>
             </a:extLst>
           </p:cNvPr>
-          <p:cNvPicPr>
-            <a:picLocks noChangeAspect="1"/>
-          </p:cNvPicPr>
+          <p:cNvPicPr/>
           <p:nvPr/>
         </p:nvPicPr>
         <p:blipFill>
@@ -6735,8 +8005,8 @@
         </p:blipFill>
         <p:spPr>
           <a:xfrm>
-            <a:off x="3316194" y="980729"/>
-            <a:ext cx="5148993" cy="5079412"/>
+            <a:off x="1166471" y="963613"/>
+            <a:ext cx="9858058" cy="5846791"/>
           </a:xfrm>
           <a:prstGeom prst="rect">
             <a:avLst/>
@@ -6759,7 +8029,7 @@
 </p:sld>
 </file>
 
-<file path=ppt/slides/slide5.xml><?xml version="1.0" encoding="utf-8"?>
+<file path=ppt/slides/slide7.xml><?xml version="1.0" encoding="utf-8"?>
 <p:sld xmlns:a="http://schemas.openxmlformats.org/drawingml/2006/main" xmlns:r="http://schemas.openxmlformats.org/officeDocument/2006/relationships" xmlns:p="http://schemas.openxmlformats.org/presentationml/2006/main">
   <p:cSld>
     <p:spTree>
@@ -7181,282 +8451,10 @@
           </a:p>
         </p:txBody>
       </p:sp>
-      <p:pic>
-        <p:nvPicPr>
-          <p:cNvPr id="7" name="Picture 6">
-            <a:extLst>
-              <a:ext uri="{FF2B5EF4-FFF2-40B4-BE49-F238E27FC236}">
-                <a16:creationId xmlns:a16="http://schemas.microsoft.com/office/drawing/2014/main" id="{0644A711-4BA1-3147-A8FC-B7212520A6C1}"/>
-              </a:ext>
-            </a:extLst>
-          </p:cNvPr>
-          <p:cNvPicPr>
-            <a:picLocks noChangeAspect="1"/>
-          </p:cNvPicPr>
-          <p:nvPr/>
-        </p:nvPicPr>
-        <p:blipFill>
-          <a:blip r:embed="rId5"/>
-          <a:stretch>
-            <a:fillRect/>
-          </a:stretch>
-        </p:blipFill>
-        <p:spPr>
-          <a:xfrm>
-            <a:off x="7716738" y="777892"/>
-            <a:ext cx="3595222" cy="3546638"/>
-          </a:xfrm>
-          <a:prstGeom prst="rect">
-            <a:avLst/>
-          </a:prstGeom>
-        </p:spPr>
-      </p:pic>
     </p:spTree>
     <p:extLst>
       <p:ext uri="{BB962C8B-B14F-4D97-AF65-F5344CB8AC3E}">
         <p14:creationId xmlns:p14="http://schemas.microsoft.com/office/powerpoint/2010/main" val="2273643269"/>
-      </p:ext>
-    </p:extLst>
-  </p:cSld>
-  <p:clrMapOvr>
-    <a:masterClrMapping/>
-  </p:clrMapOvr>
-</p:sld>
-</file>
-
-<file path=ppt/slides/slide6.xml><?xml version="1.0" encoding="utf-8"?>
-<p:sld xmlns:a="http://schemas.openxmlformats.org/drawingml/2006/main" xmlns:r="http://schemas.openxmlformats.org/officeDocument/2006/relationships" xmlns:p="http://schemas.openxmlformats.org/presentationml/2006/main">
-  <p:cSld>
-    <p:spTree>
-      <p:nvGrpSpPr>
-        <p:cNvPr id="1" name=""/>
-        <p:cNvGrpSpPr/>
-        <p:nvPr/>
-      </p:nvGrpSpPr>
-      <p:grpSpPr>
-        <a:xfrm>
-          <a:off x="0" y="0"/>
-          <a:ext cx="0" cy="0"/>
-          <a:chOff x="0" y="0"/>
-          <a:chExt cx="0" cy="0"/>
-        </a:xfrm>
-      </p:grpSpPr>
-      <p:sp>
-        <p:nvSpPr>
-          <p:cNvPr id="2" name="Title 1">
-            <a:extLst>
-              <a:ext uri="{FF2B5EF4-FFF2-40B4-BE49-F238E27FC236}">
-                <a16:creationId xmlns:a16="http://schemas.microsoft.com/office/drawing/2014/main" id="{1C00E54F-5867-4362-AF70-E8DDA4D3CD55}"/>
-              </a:ext>
-            </a:extLst>
-          </p:cNvPr>
-          <p:cNvSpPr>
-            <a:spLocks noGrp="1"/>
-          </p:cNvSpPr>
-          <p:nvPr>
-            <p:ph type="title"/>
-          </p:nvPr>
-        </p:nvSpPr>
-        <p:spPr/>
-        <p:txBody>
-          <a:bodyPr/>
-          <a:lstStyle/>
-          <a:p>
-            <a:r>
-              <a:rPr lang="da-DK" dirty="0"/>
-              <a:t>But how does this help learning?</a:t>
-            </a:r>
-            <a:endParaRPr lang="en-US" dirty="0"/>
-          </a:p>
-        </p:txBody>
-      </p:sp>
-      <p:sp>
-        <p:nvSpPr>
-          <p:cNvPr id="3" name="Content Placeholder 2">
-            <a:extLst>
-              <a:ext uri="{FF2B5EF4-FFF2-40B4-BE49-F238E27FC236}">
-                <a16:creationId xmlns:a16="http://schemas.microsoft.com/office/drawing/2014/main" id="{68380041-4542-4902-A180-F41129C31FA8}"/>
-              </a:ext>
-            </a:extLst>
-          </p:cNvPr>
-          <p:cNvSpPr>
-            <a:spLocks noGrp="1"/>
-          </p:cNvSpPr>
-          <p:nvPr>
-            <p:ph idx="1"/>
-          </p:nvPr>
-        </p:nvSpPr>
-        <p:spPr/>
-        <p:txBody>
-          <a:bodyPr>
-            <a:normAutofit lnSpcReduction="10000"/>
-          </a:bodyPr>
-          <a:lstStyle/>
-          <a:p>
-            <a:r>
-              <a:rPr lang="en-US" dirty="0"/>
-              <a:t>Give students a laboratory to </a:t>
-            </a:r>
-          </a:p>
-          <a:p>
-            <a:r>
-              <a:rPr lang="en-US" dirty="0"/>
-              <a:t>- test ideas</a:t>
-            </a:r>
-          </a:p>
-          <a:p>
-            <a:r>
-              <a:rPr lang="en-US" dirty="0"/>
-              <a:t>- observe results</a:t>
-            </a:r>
-          </a:p>
-          <a:p>
-            <a:r>
-              <a:rPr lang="en-US" dirty="0"/>
-              <a:t>- work with data</a:t>
-            </a:r>
-          </a:p>
-          <a:p>
-            <a:endParaRPr lang="en-US" dirty="0"/>
-          </a:p>
-          <a:p>
-            <a:r>
-              <a:rPr lang="en-US" dirty="0"/>
-              <a:t>And align their inner, mental model of a phenomenon with the external model</a:t>
-            </a:r>
-          </a:p>
-          <a:p>
-            <a:endParaRPr lang="en-US" dirty="0"/>
-          </a:p>
-          <a:p>
-            <a:r>
-              <a:rPr lang="en-US" dirty="0"/>
-              <a:t>“Complex Systems Thinking”</a:t>
-            </a:r>
-          </a:p>
-        </p:txBody>
-      </p:sp>
-      <p:sp>
-        <p:nvSpPr>
-          <p:cNvPr id="4" name="Date Placeholder 3">
-            <a:extLst>
-              <a:ext uri="{FF2B5EF4-FFF2-40B4-BE49-F238E27FC236}">
-                <a16:creationId xmlns:a16="http://schemas.microsoft.com/office/drawing/2014/main" id="{E3FD9AA6-1E8C-484E-B215-9A3ECB1704E1}"/>
-              </a:ext>
-            </a:extLst>
-          </p:cNvPr>
-          <p:cNvSpPr>
-            <a:spLocks noGrp="1"/>
-          </p:cNvSpPr>
-          <p:nvPr>
-            <p:ph type="dt" sz="half" idx="10"/>
-          </p:nvPr>
-        </p:nvSpPr>
-        <p:spPr/>
-        <p:txBody>
-          <a:bodyPr/>
-          <a:lstStyle/>
-          <a:p>
-            <a:fld id="{D95B5EE8-A690-4CB2-A888-A1FD31CEF0F2}" type="datetime1">
-              <a:rPr lang="en-US" smtClean="0"/>
-              <a:t>4/27/21</a:t>
-            </a:fld>
-            <a:endParaRPr lang="en-US"/>
-          </a:p>
-        </p:txBody>
-      </p:sp>
-    </p:spTree>
-    <p:extLst>
-      <p:ext uri="{BB962C8B-B14F-4D97-AF65-F5344CB8AC3E}">
-        <p14:creationId xmlns:p14="http://schemas.microsoft.com/office/powerpoint/2010/main" val="2589655739"/>
-      </p:ext>
-    </p:extLst>
-  </p:cSld>
-  <p:clrMapOvr>
-    <a:masterClrMapping/>
-  </p:clrMapOvr>
-</p:sld>
-</file>
-
-<file path=ppt/slides/slide7.xml><?xml version="1.0" encoding="utf-8"?>
-<p:sld xmlns:a="http://schemas.openxmlformats.org/drawingml/2006/main" xmlns:r="http://schemas.openxmlformats.org/officeDocument/2006/relationships" xmlns:p="http://schemas.openxmlformats.org/presentationml/2006/main">
-  <p:cSld>
-    <p:spTree>
-      <p:nvGrpSpPr>
-        <p:cNvPr id="1" name=""/>
-        <p:cNvGrpSpPr/>
-        <p:nvPr/>
-      </p:nvGrpSpPr>
-      <p:grpSpPr>
-        <a:xfrm>
-          <a:off x="0" y="0"/>
-          <a:ext cx="0" cy="0"/>
-          <a:chOff x="0" y="0"/>
-          <a:chExt cx="0" cy="0"/>
-        </a:xfrm>
-      </p:grpSpPr>
-      <p:sp>
-        <p:nvSpPr>
-          <p:cNvPr id="2" name="Date Placeholder 1"/>
-          <p:cNvSpPr>
-            <a:spLocks noGrp="1"/>
-          </p:cNvSpPr>
-          <p:nvPr>
-            <p:ph type="dt" sz="half" idx="13"/>
-          </p:nvPr>
-        </p:nvSpPr>
-        <p:spPr/>
-        <p:txBody>
-          <a:bodyPr/>
-          <a:lstStyle/>
-          <a:p>
-            <a:fld id="{EBD85B7D-E9A5-49E0-8ACF-AF93CE3E556F}" type="datetime1">
-              <a:rPr lang="da-DK" smtClean="0"/>
-              <a:t>27.04.2021</a:t>
-            </a:fld>
-            <a:r>
-              <a:rPr lang="da-DK" dirty="0"/>
-              <a:t>26-04-2021</a:t>
-            </a:r>
-          </a:p>
-        </p:txBody>
-      </p:sp>
-      <p:sp>
-        <p:nvSpPr>
-          <p:cNvPr id="3" name="Text Placeholder 2"/>
-          <p:cNvSpPr>
-            <a:spLocks noGrp="1"/>
-          </p:cNvSpPr>
-          <p:nvPr>
-            <p:ph type="body" sz="quarter" idx="16"/>
-          </p:nvPr>
-        </p:nvSpPr>
-        <p:spPr/>
-        <p:txBody>
-          <a:bodyPr/>
-          <a:lstStyle/>
-          <a:p>
-            <a:pPr lvl="0"/>
-            <a:r>
-              <a:rPr lang="da-DK" dirty="0"/>
-              <a:t>Insert Quote text, for next level ENTER and TAB</a:t>
-            </a:r>
-            <a:endParaRPr lang="da-DK"/>
-          </a:p>
-          <a:p>
-            <a:pPr lvl="1"/>
-            <a:r>
-              <a:rPr lang="da-DK" dirty="0"/>
-              <a:t>Insert Name</a:t>
-            </a:r>
-            <a:endParaRPr lang="da-DK"/>
-          </a:p>
-        </p:txBody>
-      </p:sp>
-    </p:spTree>
-    <p:extLst>
-      <p:ext uri="{BB962C8B-B14F-4D97-AF65-F5344CB8AC3E}">
-        <p14:creationId xmlns:p14="http://schemas.microsoft.com/office/powerpoint/2010/main" val="1186159921"/>
       </p:ext>
     </p:extLst>
   </p:cSld>
@@ -7524,6 +8522,18 @@
 </file>
 
 <file path=ppt/tags/tag5.xml><?xml version="1.0" encoding="utf-8"?>
+<p:tagLst xmlns:a="http://schemas.openxmlformats.org/drawingml/2006/main" xmlns:r="http://schemas.openxmlformats.org/officeDocument/2006/relationships" xmlns:p="http://schemas.openxmlformats.org/presentationml/2006/main">
+  <p:tag name="TEMPLAFYSLIDEID" val="636235437375089291"/>
+</p:tagLst>
+</file>
+
+<file path=ppt/tags/tag6.xml><?xml version="1.0" encoding="utf-8"?>
+<p:tagLst xmlns:a="http://schemas.openxmlformats.org/drawingml/2006/main" xmlns:r="http://schemas.openxmlformats.org/officeDocument/2006/relationships" xmlns:p="http://schemas.openxmlformats.org/presentationml/2006/main">
+  <p:tag name="TEMPLAFYSLIDEID" val="636235437375089291"/>
+</p:tagLst>
+</file>
+
+<file path=ppt/tags/tag7.xml><?xml version="1.0" encoding="utf-8"?>
 <p:tagLst xmlns:a="http://schemas.openxmlformats.org/drawingml/2006/main" xmlns:r="http://schemas.openxmlformats.org/officeDocument/2006/relationships" xmlns:p="http://schemas.openxmlformats.org/presentationml/2006/main">
   <p:tag name="TEMPLAFYSLIDEID" val="636235437375566864"/>
 </p:tagLst>

</xml_diff>